<commit_message>
Added slides for ML models and Pyspark
</commit_message>
<xml_diff>
--- a/traffic_violation.pptx
+++ b/traffic_violation.pptx
@@ -5,10 +5,10 @@
     <p:sldMasterId id="2147483648" r:id="rId1"/>
   </p:sldMasterIdLst>
   <p:notesMasterIdLst>
-    <p:notesMasterId r:id="rId10"/>
+    <p:notesMasterId r:id="rId14"/>
   </p:notesMasterIdLst>
   <p:handoutMasterIdLst>
-    <p:handoutMasterId r:id="rId11"/>
+    <p:handoutMasterId r:id="rId15"/>
   </p:handoutMasterIdLst>
   <p:sldIdLst>
     <p:sldId id="256" r:id="rId2"/>
@@ -16,9 +16,13 @@
     <p:sldId id="263" r:id="rId4"/>
     <p:sldId id="259" r:id="rId5"/>
     <p:sldId id="260" r:id="rId6"/>
-    <p:sldId id="261" r:id="rId7"/>
-    <p:sldId id="262" r:id="rId8"/>
-    <p:sldId id="258" r:id="rId9"/>
+    <p:sldId id="264" r:id="rId7"/>
+    <p:sldId id="272" r:id="rId8"/>
+    <p:sldId id="273" r:id="rId9"/>
+    <p:sldId id="271" r:id="rId10"/>
+    <p:sldId id="261" r:id="rId11"/>
+    <p:sldId id="262" r:id="rId12"/>
+    <p:sldId id="258" r:id="rId13"/>
   </p:sldIdLst>
   <p:sldSz cx="9144000" cy="6858000" type="screen4x3"/>
   <p:notesSz cx="6858000" cy="9144000"/>
@@ -3188,7 +3192,7 @@
 </p:sld>
 </file>
 
-<file path=ppt/slides/slide2.xml><?xml version="1.0" encoding="utf-8"?>
+<file path=ppt/slides/slide10.xml><?xml version="1.0" encoding="utf-8"?>
 <p:sld xmlns:a="http://schemas.openxmlformats.org/drawingml/2006/main" xmlns:r="http://schemas.openxmlformats.org/officeDocument/2006/relationships" xmlns:p="http://schemas.openxmlformats.org/presentationml/2006/main">
   <p:cSld>
     <p:spTree>
@@ -3207,10 +3211,10 @@
       </p:grpSpPr>
       <p:sp>
         <p:nvSpPr>
-          <p:cNvPr id="36866" name="Rectangle 2">
-            <a:extLst>
-              <a:ext uri="{FF2B5EF4-FFF2-40B4-BE49-F238E27FC236}">
-                <a16:creationId xmlns:a16="http://schemas.microsoft.com/office/drawing/2014/main" id="{CDA7C01D-4B24-EB8D-EDB4-B649E153775E}"/>
+          <p:cNvPr id="114690" name="Rectangle 2">
+            <a:extLst>
+              <a:ext uri="{FF2B5EF4-FFF2-40B4-BE49-F238E27FC236}">
+                <a16:creationId xmlns:a16="http://schemas.microsoft.com/office/drawing/2014/main" id="{E38F1BDF-7654-66E1-0814-7A6BC9C85A34}"/>
               </a:ext>
             </a:extLst>
           </p:cNvPr>
@@ -3223,29 +3227,28 @@
         </p:nvSpPr>
         <p:spPr>
           <a:xfrm>
-            <a:off x="1476375" y="476250"/>
-            <a:ext cx="7488238" cy="504825"/>
+            <a:off x="1871663" y="188913"/>
+            <a:ext cx="7092950" cy="647700"/>
           </a:xfrm>
         </p:spPr>
         <p:txBody>
           <a:bodyPr/>
           <a:lstStyle/>
           <a:p>
-            <a:r>
-              <a:rPr lang="en-US" altLang="en-US" sz="3200" dirty="0">
-                <a:latin typeface="Tahoma" panose="020B0604030504040204" pitchFamily="34" charset="0"/>
-              </a:rPr>
-              <a:t>In Focus</a:t>
-            </a:r>
+            <a:endParaRPr lang="en-US" altLang="en-US">
+              <a:solidFill>
+                <a:schemeClr val="tx1"/>
+              </a:solidFill>
+            </a:endParaRPr>
           </a:p>
         </p:txBody>
       </p:sp>
       <p:sp>
         <p:nvSpPr>
-          <p:cNvPr id="36867" name="Rectangle 3">
-            <a:extLst>
-              <a:ext uri="{FF2B5EF4-FFF2-40B4-BE49-F238E27FC236}">
-                <a16:creationId xmlns:a16="http://schemas.microsoft.com/office/drawing/2014/main" id="{789FEF1C-AD0C-4A03-25D3-75882E410332}"/>
+          <p:cNvPr id="114691" name="Rectangle 3">
+            <a:extLst>
+              <a:ext uri="{FF2B5EF4-FFF2-40B4-BE49-F238E27FC236}">
+                <a16:creationId xmlns:a16="http://schemas.microsoft.com/office/drawing/2014/main" id="{C532EC86-DEA2-C8B9-0652-CDA52A320F51}"/>
               </a:ext>
             </a:extLst>
           </p:cNvPr>
@@ -3258,79 +3261,24 @@
         </p:nvSpPr>
         <p:spPr>
           <a:xfrm>
-            <a:off x="1219200" y="2343151"/>
-            <a:ext cx="6769100" cy="4038599"/>
+            <a:off x="1860550" y="908050"/>
+            <a:ext cx="7104063" cy="5761038"/>
           </a:xfrm>
         </p:spPr>
         <p:txBody>
           <a:bodyPr/>
           <a:lstStyle/>
           <a:p>
-            <a:pPr>
-              <a:lnSpc>
-                <a:spcPct val="80000"/>
-              </a:lnSpc>
-            </a:pPr>
-            <a:r>
-              <a:rPr lang="en-US" sz="2000" b="0" i="0" dirty="0">
-                <a:solidFill>
-                  <a:srgbClr val="374151"/>
-                </a:solidFill>
-                <a:effectLst/>
-                <a:latin typeface="Times New Roman" panose="02020603050405020304" pitchFamily="18" charset="0"/>
-                <a:cs typeface="Times New Roman" panose="02020603050405020304" pitchFamily="18" charset="0"/>
-              </a:rPr>
-              <a:t>Our project delved into the landscape of traffic violations, aiming to gain a comprehensive understanding of the factors influencing outcomes, whether in the form of citations or warnings. </a:t>
-            </a:r>
-          </a:p>
-          <a:p>
-            <a:pPr>
-              <a:lnSpc>
-                <a:spcPct val="80000"/>
-              </a:lnSpc>
-            </a:pPr>
-            <a:r>
-              <a:rPr lang="en-US" sz="2000" b="0" i="0" dirty="0">
-                <a:solidFill>
-                  <a:srgbClr val="374151"/>
-                </a:solidFill>
-                <a:effectLst/>
-                <a:latin typeface="Times New Roman" panose="02020603050405020304" pitchFamily="18" charset="0"/>
-                <a:cs typeface="Times New Roman" panose="02020603050405020304" pitchFamily="18" charset="0"/>
-              </a:rPr>
-              <a:t>Our data collection process meticulously captured diverse elements of each traffic stop, including the driver's state, the make of the vehicle, and demographic information such as race and gender. </a:t>
-            </a:r>
-          </a:p>
-          <a:p>
-            <a:pPr>
-              <a:lnSpc>
-                <a:spcPct val="80000"/>
-              </a:lnSpc>
-            </a:pPr>
-            <a:r>
-              <a:rPr lang="en-US" sz="2000" b="0" i="0" dirty="0">
-                <a:solidFill>
-                  <a:srgbClr val="374151"/>
-                </a:solidFill>
-                <a:effectLst/>
-                <a:latin typeface="Times New Roman" panose="02020603050405020304" pitchFamily="18" charset="0"/>
-                <a:cs typeface="Times New Roman" panose="02020603050405020304" pitchFamily="18" charset="0"/>
-              </a:rPr>
-              <a:t>Employing a combination of statistical analysis and machine learning, we scrutinized these features to unravel correlations and patterns within the dataset. </a:t>
-            </a:r>
-          </a:p>
-          <a:p>
-            <a:pPr marL="0" indent="0">
-              <a:lnSpc>
-                <a:spcPct val="80000"/>
-              </a:lnSpc>
-              <a:buNone/>
-            </a:pPr>
-            <a:endParaRPr lang="en-US" altLang="en-US" sz="2000" dirty="0"/>
+            <a:endParaRPr lang="en-US" altLang="en-US"/>
           </a:p>
         </p:txBody>
       </p:sp>
     </p:spTree>
+    <p:extLst>
+      <p:ext uri="{BB962C8B-B14F-4D97-AF65-F5344CB8AC3E}">
+        <p14:creationId xmlns:p14="http://schemas.microsoft.com/office/powerpoint/2010/main" val="1936378657"/>
+      </p:ext>
+    </p:extLst>
   </p:cSld>
   <p:clrMapOvr>
     <a:masterClrMapping/>
@@ -3338,7 +3286,7 @@
 </p:sld>
 </file>
 
-<file path=ppt/slides/slide3.xml><?xml version="1.0" encoding="utf-8"?>
+<file path=ppt/slides/slide11.xml><?xml version="1.0" encoding="utf-8"?>
 <p:sld xmlns:a="http://schemas.openxmlformats.org/drawingml/2006/main" xmlns:r="http://schemas.openxmlformats.org/officeDocument/2006/relationships" xmlns:p="http://schemas.openxmlformats.org/presentationml/2006/main">
   <p:cSld>
     <p:spTree>
@@ -3360,423 +3308,6 @@
           <p:cNvPr id="2" name="Title 1">
             <a:extLst>
               <a:ext uri="{FF2B5EF4-FFF2-40B4-BE49-F238E27FC236}">
-                <a16:creationId xmlns:a16="http://schemas.microsoft.com/office/drawing/2014/main" id="{4A963E3E-DD40-B135-16DF-9524C441B196}"/>
-              </a:ext>
-            </a:extLst>
-          </p:cNvPr>
-          <p:cNvSpPr>
-            <a:spLocks noGrp="1"/>
-          </p:cNvSpPr>
-          <p:nvPr>
-            <p:ph type="title"/>
-          </p:nvPr>
-        </p:nvSpPr>
-        <p:spPr/>
-        <p:txBody>
-          <a:bodyPr/>
-          <a:lstStyle/>
-          <a:p>
-            <a:r>
-              <a:rPr lang="en-US" dirty="0"/>
-              <a:t>Sources </a:t>
-            </a:r>
-          </a:p>
-        </p:txBody>
-      </p:sp>
-      <p:sp>
-        <p:nvSpPr>
-          <p:cNvPr id="3" name="Content Placeholder 2">
-            <a:extLst>
-              <a:ext uri="{FF2B5EF4-FFF2-40B4-BE49-F238E27FC236}">
-                <a16:creationId xmlns:a16="http://schemas.microsoft.com/office/drawing/2014/main" id="{55CCD306-E4F4-F79A-9346-0D8C7BFBC536}"/>
-              </a:ext>
-            </a:extLst>
-          </p:cNvPr>
-          <p:cNvSpPr>
-            <a:spLocks noGrp="1"/>
-          </p:cNvSpPr>
-          <p:nvPr>
-            <p:ph idx="1"/>
-          </p:nvPr>
-        </p:nvSpPr>
-        <p:spPr>
-          <a:xfrm>
-            <a:off x="1116013" y="1524000"/>
-            <a:ext cx="7777162" cy="4713288"/>
-          </a:xfrm>
-        </p:spPr>
-        <p:txBody>
-          <a:bodyPr/>
-          <a:lstStyle/>
-          <a:p>
-            <a:endParaRPr lang="en-US" sz="2000" dirty="0"/>
-          </a:p>
-          <a:p>
-            <a:r>
-              <a:rPr lang="en-US" sz="2000" dirty="0"/>
-              <a:t>Our data comes from Montgomery County, Maryland. The dataset contains traffic violation information from all electronic traffic violations issued in the county and is updated daily. The raw data has 1.89 million rows and 43 columns. </a:t>
-            </a:r>
-          </a:p>
-          <a:p>
-            <a:pPr marL="0" indent="0">
-              <a:buNone/>
-            </a:pPr>
-            <a:endParaRPr lang="en-US" dirty="0"/>
-          </a:p>
-          <a:p>
-            <a:r>
-              <a:rPr lang="en-US" dirty="0"/>
-              <a:t>Using </a:t>
-            </a:r>
-          </a:p>
-          <a:p>
-            <a:r>
-              <a:rPr lang="en-US" sz="2000" dirty="0" err="1">
-                <a:solidFill>
-                  <a:schemeClr val="accent6">
-                    <a:lumMod val="75000"/>
-                  </a:schemeClr>
-                </a:solidFill>
-              </a:rPr>
-              <a:t>Pyspark</a:t>
-            </a:r>
-            <a:endParaRPr lang="en-US" sz="2000" dirty="0">
-              <a:solidFill>
-                <a:schemeClr val="accent6">
-                  <a:lumMod val="75000"/>
-                </a:schemeClr>
-              </a:solidFill>
-            </a:endParaRPr>
-          </a:p>
-          <a:p>
-            <a:r>
-              <a:rPr lang="en-US" sz="2000" dirty="0">
-                <a:solidFill>
-                  <a:schemeClr val="accent6">
-                    <a:lumMod val="75000"/>
-                  </a:schemeClr>
-                </a:solidFill>
-              </a:rPr>
-              <a:t>Random Forest</a:t>
-            </a:r>
-          </a:p>
-          <a:p>
-            <a:r>
-              <a:rPr lang="en-US" sz="2000" dirty="0">
-                <a:solidFill>
-                  <a:schemeClr val="accent6">
-                    <a:lumMod val="75000"/>
-                  </a:schemeClr>
-                </a:solidFill>
-              </a:rPr>
-              <a:t>Tableau</a:t>
-            </a:r>
-          </a:p>
-          <a:p>
-            <a:r>
-              <a:rPr lang="en-US" sz="2000" dirty="0">
-                <a:solidFill>
-                  <a:schemeClr val="accent6">
-                    <a:lumMod val="75000"/>
-                  </a:schemeClr>
-                </a:solidFill>
-              </a:rPr>
-              <a:t>Python/Pandas</a:t>
-            </a:r>
-          </a:p>
-        </p:txBody>
-      </p:sp>
-    </p:spTree>
-    <p:extLst>
-      <p:ext uri="{BB962C8B-B14F-4D97-AF65-F5344CB8AC3E}">
-        <p14:creationId xmlns:p14="http://schemas.microsoft.com/office/powerpoint/2010/main" val="2635689727"/>
-      </p:ext>
-    </p:extLst>
-  </p:cSld>
-  <p:clrMapOvr>
-    <a:masterClrMapping/>
-  </p:clrMapOvr>
-</p:sld>
-</file>
-
-<file path=ppt/slides/slide4.xml><?xml version="1.0" encoding="utf-8"?>
-<p:sld xmlns:a="http://schemas.openxmlformats.org/drawingml/2006/main" xmlns:r="http://schemas.openxmlformats.org/officeDocument/2006/relationships" xmlns:p="http://schemas.openxmlformats.org/presentationml/2006/main">
-  <p:cSld>
-    <p:spTree>
-      <p:nvGrpSpPr>
-        <p:cNvPr id="1" name=""/>
-        <p:cNvGrpSpPr/>
-        <p:nvPr/>
-      </p:nvGrpSpPr>
-      <p:grpSpPr>
-        <a:xfrm>
-          <a:off x="0" y="0"/>
-          <a:ext cx="0" cy="0"/>
-          <a:chOff x="0" y="0"/>
-          <a:chExt cx="0" cy="0"/>
-        </a:xfrm>
-      </p:grpSpPr>
-      <p:sp>
-        <p:nvSpPr>
-          <p:cNvPr id="114690" name="Rectangle 2">
-            <a:extLst>
-              <a:ext uri="{FF2B5EF4-FFF2-40B4-BE49-F238E27FC236}">
-                <a16:creationId xmlns:a16="http://schemas.microsoft.com/office/drawing/2014/main" id="{E38F1BDF-7654-66E1-0814-7A6BC9C85A34}"/>
-              </a:ext>
-            </a:extLst>
-          </p:cNvPr>
-          <p:cNvSpPr>
-            <a:spLocks noGrp="1" noChangeArrowheads="1"/>
-          </p:cNvSpPr>
-          <p:nvPr>
-            <p:ph type="title"/>
-          </p:nvPr>
-        </p:nvSpPr>
-        <p:spPr>
-          <a:xfrm>
-            <a:off x="1025525" y="2438400"/>
-            <a:ext cx="7092950" cy="647700"/>
-          </a:xfrm>
-        </p:spPr>
-        <p:txBody>
-          <a:bodyPr/>
-          <a:lstStyle/>
-          <a:p>
-            <a:pPr algn="ctr"/>
-            <a:r>
-              <a:rPr lang="en-US" altLang="en-US" dirty="0">
-                <a:solidFill>
-                  <a:schemeClr val="tx1"/>
-                </a:solidFill>
-              </a:rPr>
-              <a:t>Data Cleaning</a:t>
-            </a:r>
-          </a:p>
-        </p:txBody>
-      </p:sp>
-    </p:spTree>
-    <p:extLst>
-      <p:ext uri="{BB962C8B-B14F-4D97-AF65-F5344CB8AC3E}">
-        <p14:creationId xmlns:p14="http://schemas.microsoft.com/office/powerpoint/2010/main" val="1242657746"/>
-      </p:ext>
-    </p:extLst>
-  </p:cSld>
-  <p:clrMapOvr>
-    <a:masterClrMapping/>
-  </p:clrMapOvr>
-</p:sld>
-</file>
-
-<file path=ppt/slides/slide5.xml><?xml version="1.0" encoding="utf-8"?>
-<p:sld xmlns:a="http://schemas.openxmlformats.org/drawingml/2006/main" xmlns:r="http://schemas.openxmlformats.org/officeDocument/2006/relationships" xmlns:p="http://schemas.openxmlformats.org/presentationml/2006/main">
-  <p:cSld>
-    <p:spTree>
-      <p:nvGrpSpPr>
-        <p:cNvPr id="1" name=""/>
-        <p:cNvGrpSpPr/>
-        <p:nvPr/>
-      </p:nvGrpSpPr>
-      <p:grpSpPr>
-        <a:xfrm>
-          <a:off x="0" y="0"/>
-          <a:ext cx="0" cy="0"/>
-          <a:chOff x="0" y="0"/>
-          <a:chExt cx="0" cy="0"/>
-        </a:xfrm>
-      </p:grpSpPr>
-      <p:sp>
-        <p:nvSpPr>
-          <p:cNvPr id="114690" name="Rectangle 2">
-            <a:extLst>
-              <a:ext uri="{FF2B5EF4-FFF2-40B4-BE49-F238E27FC236}">
-                <a16:creationId xmlns:a16="http://schemas.microsoft.com/office/drawing/2014/main" id="{E38F1BDF-7654-66E1-0814-7A6BC9C85A34}"/>
-              </a:ext>
-            </a:extLst>
-          </p:cNvPr>
-          <p:cNvSpPr>
-            <a:spLocks noGrp="1" noChangeArrowheads="1"/>
-          </p:cNvSpPr>
-          <p:nvPr>
-            <p:ph type="title"/>
-          </p:nvPr>
-        </p:nvSpPr>
-        <p:spPr>
-          <a:xfrm>
-            <a:off x="1871663" y="188913"/>
-            <a:ext cx="7092950" cy="647700"/>
-          </a:xfrm>
-        </p:spPr>
-        <p:txBody>
-          <a:bodyPr/>
-          <a:lstStyle/>
-          <a:p>
-            <a:endParaRPr lang="en-US" altLang="en-US">
-              <a:solidFill>
-                <a:schemeClr val="tx1"/>
-              </a:solidFill>
-            </a:endParaRPr>
-          </a:p>
-        </p:txBody>
-      </p:sp>
-      <p:sp>
-        <p:nvSpPr>
-          <p:cNvPr id="114691" name="Rectangle 3">
-            <a:extLst>
-              <a:ext uri="{FF2B5EF4-FFF2-40B4-BE49-F238E27FC236}">
-                <a16:creationId xmlns:a16="http://schemas.microsoft.com/office/drawing/2014/main" id="{C532EC86-DEA2-C8B9-0652-CDA52A320F51}"/>
-              </a:ext>
-            </a:extLst>
-          </p:cNvPr>
-          <p:cNvSpPr>
-            <a:spLocks noGrp="1" noChangeArrowheads="1"/>
-          </p:cNvSpPr>
-          <p:nvPr>
-            <p:ph type="body" idx="1"/>
-          </p:nvPr>
-        </p:nvSpPr>
-        <p:spPr>
-          <a:xfrm>
-            <a:off x="1860550" y="908050"/>
-            <a:ext cx="7104063" cy="5761038"/>
-          </a:xfrm>
-        </p:spPr>
-        <p:txBody>
-          <a:bodyPr/>
-          <a:lstStyle/>
-          <a:p>
-            <a:endParaRPr lang="en-US" altLang="en-US"/>
-          </a:p>
-        </p:txBody>
-      </p:sp>
-    </p:spTree>
-    <p:extLst>
-      <p:ext uri="{BB962C8B-B14F-4D97-AF65-F5344CB8AC3E}">
-        <p14:creationId xmlns:p14="http://schemas.microsoft.com/office/powerpoint/2010/main" val="1443540934"/>
-      </p:ext>
-    </p:extLst>
-  </p:cSld>
-  <p:clrMapOvr>
-    <a:masterClrMapping/>
-  </p:clrMapOvr>
-</p:sld>
-</file>
-
-<file path=ppt/slides/slide6.xml><?xml version="1.0" encoding="utf-8"?>
-<p:sld xmlns:a="http://schemas.openxmlformats.org/drawingml/2006/main" xmlns:r="http://schemas.openxmlformats.org/officeDocument/2006/relationships" xmlns:p="http://schemas.openxmlformats.org/presentationml/2006/main">
-  <p:cSld>
-    <p:spTree>
-      <p:nvGrpSpPr>
-        <p:cNvPr id="1" name=""/>
-        <p:cNvGrpSpPr/>
-        <p:nvPr/>
-      </p:nvGrpSpPr>
-      <p:grpSpPr>
-        <a:xfrm>
-          <a:off x="0" y="0"/>
-          <a:ext cx="0" cy="0"/>
-          <a:chOff x="0" y="0"/>
-          <a:chExt cx="0" cy="0"/>
-        </a:xfrm>
-      </p:grpSpPr>
-      <p:sp>
-        <p:nvSpPr>
-          <p:cNvPr id="114690" name="Rectangle 2">
-            <a:extLst>
-              <a:ext uri="{FF2B5EF4-FFF2-40B4-BE49-F238E27FC236}">
-                <a16:creationId xmlns:a16="http://schemas.microsoft.com/office/drawing/2014/main" id="{E38F1BDF-7654-66E1-0814-7A6BC9C85A34}"/>
-              </a:ext>
-            </a:extLst>
-          </p:cNvPr>
-          <p:cNvSpPr>
-            <a:spLocks noGrp="1" noChangeArrowheads="1"/>
-          </p:cNvSpPr>
-          <p:nvPr>
-            <p:ph type="title"/>
-          </p:nvPr>
-        </p:nvSpPr>
-        <p:spPr>
-          <a:xfrm>
-            <a:off x="1871663" y="188913"/>
-            <a:ext cx="7092950" cy="647700"/>
-          </a:xfrm>
-        </p:spPr>
-        <p:txBody>
-          <a:bodyPr/>
-          <a:lstStyle/>
-          <a:p>
-            <a:endParaRPr lang="en-US" altLang="en-US">
-              <a:solidFill>
-                <a:schemeClr val="tx1"/>
-              </a:solidFill>
-            </a:endParaRPr>
-          </a:p>
-        </p:txBody>
-      </p:sp>
-      <p:sp>
-        <p:nvSpPr>
-          <p:cNvPr id="114691" name="Rectangle 3">
-            <a:extLst>
-              <a:ext uri="{FF2B5EF4-FFF2-40B4-BE49-F238E27FC236}">
-                <a16:creationId xmlns:a16="http://schemas.microsoft.com/office/drawing/2014/main" id="{C532EC86-DEA2-C8B9-0652-CDA52A320F51}"/>
-              </a:ext>
-            </a:extLst>
-          </p:cNvPr>
-          <p:cNvSpPr>
-            <a:spLocks noGrp="1" noChangeArrowheads="1"/>
-          </p:cNvSpPr>
-          <p:nvPr>
-            <p:ph type="body" idx="1"/>
-          </p:nvPr>
-        </p:nvSpPr>
-        <p:spPr>
-          <a:xfrm>
-            <a:off x="1860550" y="908050"/>
-            <a:ext cx="7104063" cy="5761038"/>
-          </a:xfrm>
-        </p:spPr>
-        <p:txBody>
-          <a:bodyPr/>
-          <a:lstStyle/>
-          <a:p>
-            <a:endParaRPr lang="en-US" altLang="en-US"/>
-          </a:p>
-        </p:txBody>
-      </p:sp>
-    </p:spTree>
-    <p:extLst>
-      <p:ext uri="{BB962C8B-B14F-4D97-AF65-F5344CB8AC3E}">
-        <p14:creationId xmlns:p14="http://schemas.microsoft.com/office/powerpoint/2010/main" val="1936378657"/>
-      </p:ext>
-    </p:extLst>
-  </p:cSld>
-  <p:clrMapOvr>
-    <a:masterClrMapping/>
-  </p:clrMapOvr>
-</p:sld>
-</file>
-
-<file path=ppt/slides/slide7.xml><?xml version="1.0" encoding="utf-8"?>
-<p:sld xmlns:a="http://schemas.openxmlformats.org/drawingml/2006/main" xmlns:r="http://schemas.openxmlformats.org/officeDocument/2006/relationships" xmlns:p="http://schemas.openxmlformats.org/presentationml/2006/main">
-  <p:cSld>
-    <p:spTree>
-      <p:nvGrpSpPr>
-        <p:cNvPr id="1" name=""/>
-        <p:cNvGrpSpPr/>
-        <p:nvPr/>
-      </p:nvGrpSpPr>
-      <p:grpSpPr>
-        <a:xfrm>
-          <a:off x="0" y="0"/>
-          <a:ext cx="0" cy="0"/>
-          <a:chOff x="0" y="0"/>
-          <a:chExt cx="0" cy="0"/>
-        </a:xfrm>
-      </p:grpSpPr>
-      <p:sp>
-        <p:nvSpPr>
-          <p:cNvPr id="2" name="Title 1">
-            <a:extLst>
-              <a:ext uri="{FF2B5EF4-FFF2-40B4-BE49-F238E27FC236}">
                 <a16:creationId xmlns:a16="http://schemas.microsoft.com/office/drawing/2014/main" id="{65F70101-2480-4920-3D6F-424F65D6E233}"/>
               </a:ext>
             </a:extLst>
@@ -3835,7 +3366,7 @@
 </p:sld>
 </file>
 
-<file path=ppt/slides/slide8.xml><?xml version="1.0" encoding="utf-8"?>
+<file path=ppt/slides/slide12.xml><?xml version="1.0" encoding="utf-8"?>
 <p:sld xmlns:a="http://schemas.openxmlformats.org/drawingml/2006/main" xmlns:r="http://schemas.openxmlformats.org/officeDocument/2006/relationships" xmlns:p="http://schemas.openxmlformats.org/presentationml/2006/main">
   <p:cSld>
     <p:bg>
@@ -4110,6 +3641,2379 @@
         </p:style>
       </p:cxnSp>
     </p:spTree>
+  </p:cSld>
+  <p:clrMapOvr>
+    <a:masterClrMapping/>
+  </p:clrMapOvr>
+</p:sld>
+</file>
+
+<file path=ppt/slides/slide2.xml><?xml version="1.0" encoding="utf-8"?>
+<p:sld xmlns:a="http://schemas.openxmlformats.org/drawingml/2006/main" xmlns:r="http://schemas.openxmlformats.org/officeDocument/2006/relationships" xmlns:p="http://schemas.openxmlformats.org/presentationml/2006/main">
+  <p:cSld>
+    <p:spTree>
+      <p:nvGrpSpPr>
+        <p:cNvPr id="1" name=""/>
+        <p:cNvGrpSpPr/>
+        <p:nvPr/>
+      </p:nvGrpSpPr>
+      <p:grpSpPr>
+        <a:xfrm>
+          <a:off x="0" y="0"/>
+          <a:ext cx="0" cy="0"/>
+          <a:chOff x="0" y="0"/>
+          <a:chExt cx="0" cy="0"/>
+        </a:xfrm>
+      </p:grpSpPr>
+      <p:sp>
+        <p:nvSpPr>
+          <p:cNvPr id="36866" name="Rectangle 2">
+            <a:extLst>
+              <a:ext uri="{FF2B5EF4-FFF2-40B4-BE49-F238E27FC236}">
+                <a16:creationId xmlns:a16="http://schemas.microsoft.com/office/drawing/2014/main" id="{CDA7C01D-4B24-EB8D-EDB4-B649E153775E}"/>
+              </a:ext>
+            </a:extLst>
+          </p:cNvPr>
+          <p:cNvSpPr>
+            <a:spLocks noGrp="1" noChangeArrowheads="1"/>
+          </p:cNvSpPr>
+          <p:nvPr>
+            <p:ph type="title"/>
+          </p:nvPr>
+        </p:nvSpPr>
+        <p:spPr>
+          <a:xfrm>
+            <a:off x="1476375" y="476250"/>
+            <a:ext cx="7488238" cy="504825"/>
+          </a:xfrm>
+        </p:spPr>
+        <p:txBody>
+          <a:bodyPr/>
+          <a:lstStyle/>
+          <a:p>
+            <a:r>
+              <a:rPr lang="en-US" altLang="en-US" sz="3200" dirty="0">
+                <a:latin typeface="Tahoma" panose="020B0604030504040204" pitchFamily="34" charset="0"/>
+              </a:rPr>
+              <a:t>In Focus</a:t>
+            </a:r>
+          </a:p>
+        </p:txBody>
+      </p:sp>
+      <p:sp>
+        <p:nvSpPr>
+          <p:cNvPr id="36867" name="Rectangle 3">
+            <a:extLst>
+              <a:ext uri="{FF2B5EF4-FFF2-40B4-BE49-F238E27FC236}">
+                <a16:creationId xmlns:a16="http://schemas.microsoft.com/office/drawing/2014/main" id="{789FEF1C-AD0C-4A03-25D3-75882E410332}"/>
+              </a:ext>
+            </a:extLst>
+          </p:cNvPr>
+          <p:cNvSpPr>
+            <a:spLocks noGrp="1" noChangeArrowheads="1"/>
+          </p:cNvSpPr>
+          <p:nvPr>
+            <p:ph type="body" idx="1"/>
+          </p:nvPr>
+        </p:nvSpPr>
+        <p:spPr>
+          <a:xfrm>
+            <a:off x="1219200" y="2343151"/>
+            <a:ext cx="6769100" cy="4038599"/>
+          </a:xfrm>
+        </p:spPr>
+        <p:txBody>
+          <a:bodyPr/>
+          <a:lstStyle/>
+          <a:p>
+            <a:pPr>
+              <a:lnSpc>
+                <a:spcPct val="80000"/>
+              </a:lnSpc>
+            </a:pPr>
+            <a:r>
+              <a:rPr lang="en-US" sz="2000" b="0" i="0" dirty="0">
+                <a:solidFill>
+                  <a:srgbClr val="374151"/>
+                </a:solidFill>
+                <a:effectLst/>
+                <a:latin typeface="Times New Roman" panose="02020603050405020304" pitchFamily="18" charset="0"/>
+                <a:cs typeface="Times New Roman" panose="02020603050405020304" pitchFamily="18" charset="0"/>
+              </a:rPr>
+              <a:t>Our project delved into the landscape of traffic violations, aiming to gain a comprehensive understanding of the factors influencing outcomes, whether in the form of citations or warnings. </a:t>
+            </a:r>
+          </a:p>
+          <a:p>
+            <a:pPr>
+              <a:lnSpc>
+                <a:spcPct val="80000"/>
+              </a:lnSpc>
+            </a:pPr>
+            <a:r>
+              <a:rPr lang="en-US" sz="2000" b="0" i="0" dirty="0">
+                <a:solidFill>
+                  <a:srgbClr val="374151"/>
+                </a:solidFill>
+                <a:effectLst/>
+                <a:latin typeface="Times New Roman" panose="02020603050405020304" pitchFamily="18" charset="0"/>
+                <a:cs typeface="Times New Roman" panose="02020603050405020304" pitchFamily="18" charset="0"/>
+              </a:rPr>
+              <a:t>Our data collection process meticulously captured diverse elements of each traffic stop, including the driver's state, the make of the vehicle, and demographic information such as race and gender. </a:t>
+            </a:r>
+          </a:p>
+          <a:p>
+            <a:pPr>
+              <a:lnSpc>
+                <a:spcPct val="80000"/>
+              </a:lnSpc>
+            </a:pPr>
+            <a:r>
+              <a:rPr lang="en-US" sz="2000" b="0" i="0" dirty="0">
+                <a:solidFill>
+                  <a:srgbClr val="374151"/>
+                </a:solidFill>
+                <a:effectLst/>
+                <a:latin typeface="Times New Roman" panose="02020603050405020304" pitchFamily="18" charset="0"/>
+                <a:cs typeface="Times New Roman" panose="02020603050405020304" pitchFamily="18" charset="0"/>
+              </a:rPr>
+              <a:t>Employing a combination of statistical analysis and machine learning, we scrutinized these features to unravel correlations and patterns within the dataset. </a:t>
+            </a:r>
+          </a:p>
+          <a:p>
+            <a:pPr marL="0" indent="0">
+              <a:lnSpc>
+                <a:spcPct val="80000"/>
+              </a:lnSpc>
+              <a:buNone/>
+            </a:pPr>
+            <a:endParaRPr lang="en-US" altLang="en-US" sz="2000" dirty="0"/>
+          </a:p>
+        </p:txBody>
+      </p:sp>
+    </p:spTree>
+  </p:cSld>
+  <p:clrMapOvr>
+    <a:masterClrMapping/>
+  </p:clrMapOvr>
+</p:sld>
+</file>
+
+<file path=ppt/slides/slide3.xml><?xml version="1.0" encoding="utf-8"?>
+<p:sld xmlns:a="http://schemas.openxmlformats.org/drawingml/2006/main" xmlns:r="http://schemas.openxmlformats.org/officeDocument/2006/relationships" xmlns:p="http://schemas.openxmlformats.org/presentationml/2006/main">
+  <p:cSld>
+    <p:spTree>
+      <p:nvGrpSpPr>
+        <p:cNvPr id="1" name=""/>
+        <p:cNvGrpSpPr/>
+        <p:nvPr/>
+      </p:nvGrpSpPr>
+      <p:grpSpPr>
+        <a:xfrm>
+          <a:off x="0" y="0"/>
+          <a:ext cx="0" cy="0"/>
+          <a:chOff x="0" y="0"/>
+          <a:chExt cx="0" cy="0"/>
+        </a:xfrm>
+      </p:grpSpPr>
+      <p:sp>
+        <p:nvSpPr>
+          <p:cNvPr id="2" name="Title 1">
+            <a:extLst>
+              <a:ext uri="{FF2B5EF4-FFF2-40B4-BE49-F238E27FC236}">
+                <a16:creationId xmlns:a16="http://schemas.microsoft.com/office/drawing/2014/main" id="{4A963E3E-DD40-B135-16DF-9524C441B196}"/>
+              </a:ext>
+            </a:extLst>
+          </p:cNvPr>
+          <p:cNvSpPr>
+            <a:spLocks noGrp="1"/>
+          </p:cNvSpPr>
+          <p:nvPr>
+            <p:ph type="title"/>
+          </p:nvPr>
+        </p:nvSpPr>
+        <p:spPr/>
+        <p:txBody>
+          <a:bodyPr/>
+          <a:lstStyle/>
+          <a:p>
+            <a:r>
+              <a:rPr lang="en-US" dirty="0"/>
+              <a:t>Sources </a:t>
+            </a:r>
+          </a:p>
+        </p:txBody>
+      </p:sp>
+      <p:sp>
+        <p:nvSpPr>
+          <p:cNvPr id="3" name="Content Placeholder 2">
+            <a:extLst>
+              <a:ext uri="{FF2B5EF4-FFF2-40B4-BE49-F238E27FC236}">
+                <a16:creationId xmlns:a16="http://schemas.microsoft.com/office/drawing/2014/main" id="{55CCD306-E4F4-F79A-9346-0D8C7BFBC536}"/>
+              </a:ext>
+            </a:extLst>
+          </p:cNvPr>
+          <p:cNvSpPr>
+            <a:spLocks noGrp="1"/>
+          </p:cNvSpPr>
+          <p:nvPr>
+            <p:ph idx="1"/>
+          </p:nvPr>
+        </p:nvSpPr>
+        <p:spPr>
+          <a:xfrm>
+            <a:off x="1116013" y="1524000"/>
+            <a:ext cx="7777162" cy="4713288"/>
+          </a:xfrm>
+        </p:spPr>
+        <p:txBody>
+          <a:bodyPr/>
+          <a:lstStyle/>
+          <a:p>
+            <a:endParaRPr lang="en-US" sz="2000" dirty="0"/>
+          </a:p>
+          <a:p>
+            <a:r>
+              <a:rPr lang="en-US" sz="2000" dirty="0"/>
+              <a:t>Our data comes from Montgomery County, Maryland. The dataset contains traffic violation information from all electronic traffic violations issued in the county and is updated daily. The raw data has 1.89 million rows and 43 columns. </a:t>
+            </a:r>
+          </a:p>
+          <a:p>
+            <a:pPr marL="0" indent="0">
+              <a:buNone/>
+            </a:pPr>
+            <a:endParaRPr lang="en-US" dirty="0"/>
+          </a:p>
+          <a:p>
+            <a:r>
+              <a:rPr lang="en-US" dirty="0"/>
+              <a:t>Using </a:t>
+            </a:r>
+          </a:p>
+          <a:p>
+            <a:r>
+              <a:rPr lang="en-US" sz="2000" dirty="0">
+                <a:solidFill>
+                  <a:schemeClr val="accent6">
+                    <a:lumMod val="75000"/>
+                  </a:schemeClr>
+                </a:solidFill>
+              </a:rPr>
+              <a:t>Python/Pandas</a:t>
+            </a:r>
+          </a:p>
+          <a:p>
+            <a:r>
+              <a:rPr lang="en-US" sz="2000" dirty="0">
+                <a:solidFill>
+                  <a:schemeClr val="accent6">
+                    <a:lumMod val="75000"/>
+                  </a:schemeClr>
+                </a:solidFill>
+              </a:rPr>
+              <a:t>Tableau</a:t>
+            </a:r>
+          </a:p>
+          <a:p>
+            <a:r>
+              <a:rPr lang="en-US" sz="2000" dirty="0">
+                <a:solidFill>
+                  <a:schemeClr val="accent6">
+                    <a:lumMod val="75000"/>
+                  </a:schemeClr>
+                </a:solidFill>
+              </a:rPr>
+              <a:t>Random Forest</a:t>
+            </a:r>
+          </a:p>
+          <a:p>
+            <a:r>
+              <a:rPr lang="en-US" sz="2000" dirty="0" err="1">
+                <a:solidFill>
+                  <a:schemeClr val="accent6">
+                    <a:lumMod val="75000"/>
+                  </a:schemeClr>
+                </a:solidFill>
+              </a:rPr>
+              <a:t>Pyspark</a:t>
+            </a:r>
+            <a:endParaRPr lang="en-US" sz="2000" dirty="0">
+              <a:solidFill>
+                <a:schemeClr val="accent6">
+                  <a:lumMod val="75000"/>
+                </a:schemeClr>
+              </a:solidFill>
+            </a:endParaRPr>
+          </a:p>
+        </p:txBody>
+      </p:sp>
+    </p:spTree>
+    <p:extLst>
+      <p:ext uri="{BB962C8B-B14F-4D97-AF65-F5344CB8AC3E}">
+        <p14:creationId xmlns:p14="http://schemas.microsoft.com/office/powerpoint/2010/main" val="2635689727"/>
+      </p:ext>
+    </p:extLst>
+  </p:cSld>
+  <p:clrMapOvr>
+    <a:masterClrMapping/>
+  </p:clrMapOvr>
+</p:sld>
+</file>
+
+<file path=ppt/slides/slide4.xml><?xml version="1.0" encoding="utf-8"?>
+<p:sld xmlns:a="http://schemas.openxmlformats.org/drawingml/2006/main" xmlns:r="http://schemas.openxmlformats.org/officeDocument/2006/relationships" xmlns:p="http://schemas.openxmlformats.org/presentationml/2006/main">
+  <p:cSld>
+    <p:spTree>
+      <p:nvGrpSpPr>
+        <p:cNvPr id="1" name=""/>
+        <p:cNvGrpSpPr/>
+        <p:nvPr/>
+      </p:nvGrpSpPr>
+      <p:grpSpPr>
+        <a:xfrm>
+          <a:off x="0" y="0"/>
+          <a:ext cx="0" cy="0"/>
+          <a:chOff x="0" y="0"/>
+          <a:chExt cx="0" cy="0"/>
+        </a:xfrm>
+      </p:grpSpPr>
+      <p:sp>
+        <p:nvSpPr>
+          <p:cNvPr id="114690" name="Rectangle 2">
+            <a:extLst>
+              <a:ext uri="{FF2B5EF4-FFF2-40B4-BE49-F238E27FC236}">
+                <a16:creationId xmlns:a16="http://schemas.microsoft.com/office/drawing/2014/main" id="{E38F1BDF-7654-66E1-0814-7A6BC9C85A34}"/>
+              </a:ext>
+            </a:extLst>
+          </p:cNvPr>
+          <p:cNvSpPr>
+            <a:spLocks noGrp="1" noChangeArrowheads="1"/>
+          </p:cNvSpPr>
+          <p:nvPr>
+            <p:ph type="title"/>
+          </p:nvPr>
+        </p:nvSpPr>
+        <p:spPr>
+          <a:xfrm>
+            <a:off x="1025525" y="2438400"/>
+            <a:ext cx="7092950" cy="647700"/>
+          </a:xfrm>
+        </p:spPr>
+        <p:txBody>
+          <a:bodyPr/>
+          <a:lstStyle/>
+          <a:p>
+            <a:pPr algn="ctr"/>
+            <a:r>
+              <a:rPr lang="en-US" altLang="en-US" dirty="0">
+                <a:solidFill>
+                  <a:schemeClr val="tx1"/>
+                </a:solidFill>
+              </a:rPr>
+              <a:t>Data Cleaning</a:t>
+            </a:r>
+          </a:p>
+        </p:txBody>
+      </p:sp>
+    </p:spTree>
+    <p:extLst>
+      <p:ext uri="{BB962C8B-B14F-4D97-AF65-F5344CB8AC3E}">
+        <p14:creationId xmlns:p14="http://schemas.microsoft.com/office/powerpoint/2010/main" val="1242657746"/>
+      </p:ext>
+    </p:extLst>
+  </p:cSld>
+  <p:clrMapOvr>
+    <a:masterClrMapping/>
+  </p:clrMapOvr>
+</p:sld>
+</file>
+
+<file path=ppt/slides/slide5.xml><?xml version="1.0" encoding="utf-8"?>
+<p:sld xmlns:a="http://schemas.openxmlformats.org/drawingml/2006/main" xmlns:r="http://schemas.openxmlformats.org/officeDocument/2006/relationships" xmlns:p="http://schemas.openxmlformats.org/presentationml/2006/main">
+  <p:cSld>
+    <p:spTree>
+      <p:nvGrpSpPr>
+        <p:cNvPr id="1" name=""/>
+        <p:cNvGrpSpPr/>
+        <p:nvPr/>
+      </p:nvGrpSpPr>
+      <p:grpSpPr>
+        <a:xfrm>
+          <a:off x="0" y="0"/>
+          <a:ext cx="0" cy="0"/>
+          <a:chOff x="0" y="0"/>
+          <a:chExt cx="0" cy="0"/>
+        </a:xfrm>
+      </p:grpSpPr>
+      <p:sp>
+        <p:nvSpPr>
+          <p:cNvPr id="114690" name="Rectangle 2">
+            <a:extLst>
+              <a:ext uri="{FF2B5EF4-FFF2-40B4-BE49-F238E27FC236}">
+                <a16:creationId xmlns:a16="http://schemas.microsoft.com/office/drawing/2014/main" id="{E38F1BDF-7654-66E1-0814-7A6BC9C85A34}"/>
+              </a:ext>
+            </a:extLst>
+          </p:cNvPr>
+          <p:cNvSpPr>
+            <a:spLocks noGrp="1" noChangeArrowheads="1"/>
+          </p:cNvSpPr>
+          <p:nvPr>
+            <p:ph type="title"/>
+          </p:nvPr>
+        </p:nvSpPr>
+        <p:spPr>
+          <a:xfrm>
+            <a:off x="1871663" y="188913"/>
+            <a:ext cx="7092950" cy="647700"/>
+          </a:xfrm>
+        </p:spPr>
+        <p:txBody>
+          <a:bodyPr/>
+          <a:lstStyle/>
+          <a:p>
+            <a:endParaRPr lang="en-US" altLang="en-US">
+              <a:solidFill>
+                <a:schemeClr val="tx1"/>
+              </a:solidFill>
+            </a:endParaRPr>
+          </a:p>
+        </p:txBody>
+      </p:sp>
+      <p:sp>
+        <p:nvSpPr>
+          <p:cNvPr id="114691" name="Rectangle 3">
+            <a:extLst>
+              <a:ext uri="{FF2B5EF4-FFF2-40B4-BE49-F238E27FC236}">
+                <a16:creationId xmlns:a16="http://schemas.microsoft.com/office/drawing/2014/main" id="{C532EC86-DEA2-C8B9-0652-CDA52A320F51}"/>
+              </a:ext>
+            </a:extLst>
+          </p:cNvPr>
+          <p:cNvSpPr>
+            <a:spLocks noGrp="1" noChangeArrowheads="1"/>
+          </p:cNvSpPr>
+          <p:nvPr>
+            <p:ph type="body" idx="1"/>
+          </p:nvPr>
+        </p:nvSpPr>
+        <p:spPr>
+          <a:xfrm>
+            <a:off x="1860550" y="908050"/>
+            <a:ext cx="7104063" cy="5761038"/>
+          </a:xfrm>
+        </p:spPr>
+        <p:txBody>
+          <a:bodyPr/>
+          <a:lstStyle/>
+          <a:p>
+            <a:endParaRPr lang="en-US" altLang="en-US"/>
+          </a:p>
+        </p:txBody>
+      </p:sp>
+    </p:spTree>
+    <p:extLst>
+      <p:ext uri="{BB962C8B-B14F-4D97-AF65-F5344CB8AC3E}">
+        <p14:creationId xmlns:p14="http://schemas.microsoft.com/office/powerpoint/2010/main" val="1443540934"/>
+      </p:ext>
+    </p:extLst>
+  </p:cSld>
+  <p:clrMapOvr>
+    <a:masterClrMapping/>
+  </p:clrMapOvr>
+</p:sld>
+</file>
+
+<file path=ppt/slides/slide6.xml><?xml version="1.0" encoding="utf-8"?>
+<p:sld xmlns:a="http://schemas.openxmlformats.org/drawingml/2006/main" xmlns:r="http://schemas.openxmlformats.org/officeDocument/2006/relationships" xmlns:p="http://schemas.openxmlformats.org/presentationml/2006/main">
+  <p:cSld>
+    <p:spTree>
+      <p:nvGrpSpPr>
+        <p:cNvPr id="1" name=""/>
+        <p:cNvGrpSpPr/>
+        <p:nvPr/>
+      </p:nvGrpSpPr>
+      <p:grpSpPr>
+        <a:xfrm>
+          <a:off x="0" y="0"/>
+          <a:ext cx="0" cy="0"/>
+          <a:chOff x="0" y="0"/>
+          <a:chExt cx="0" cy="0"/>
+        </a:xfrm>
+      </p:grpSpPr>
+      <p:sp>
+        <p:nvSpPr>
+          <p:cNvPr id="2" name="Title 1">
+            <a:extLst>
+              <a:ext uri="{FF2B5EF4-FFF2-40B4-BE49-F238E27FC236}">
+                <a16:creationId xmlns:a16="http://schemas.microsoft.com/office/drawing/2014/main" id="{65F70101-2480-4920-3D6F-424F65D6E233}"/>
+              </a:ext>
+            </a:extLst>
+          </p:cNvPr>
+          <p:cNvSpPr>
+            <a:spLocks noGrp="1"/>
+          </p:cNvSpPr>
+          <p:nvPr>
+            <p:ph type="title"/>
+          </p:nvPr>
+        </p:nvSpPr>
+        <p:spPr/>
+        <p:txBody>
+          <a:bodyPr/>
+          <a:lstStyle/>
+          <a:p>
+            <a:r>
+              <a:rPr lang="en-US" dirty="0"/>
+              <a:t>Machine Learning Models</a:t>
+            </a:r>
+          </a:p>
+        </p:txBody>
+      </p:sp>
+      <p:sp>
+        <p:nvSpPr>
+          <p:cNvPr id="3" name="Content Placeholder 2">
+            <a:extLst>
+              <a:ext uri="{FF2B5EF4-FFF2-40B4-BE49-F238E27FC236}">
+                <a16:creationId xmlns:a16="http://schemas.microsoft.com/office/drawing/2014/main" id="{27E4D1F4-BC64-FC19-216E-265BDA4AEDA4}"/>
+              </a:ext>
+            </a:extLst>
+          </p:cNvPr>
+          <p:cNvSpPr>
+            <a:spLocks noGrp="1"/>
+          </p:cNvSpPr>
+          <p:nvPr>
+            <p:ph idx="1"/>
+          </p:nvPr>
+        </p:nvSpPr>
+        <p:spPr>
+          <a:xfrm>
+            <a:off x="1116013" y="1268413"/>
+            <a:ext cx="7777162" cy="5184774"/>
+          </a:xfrm>
+        </p:spPr>
+        <p:txBody>
+          <a:bodyPr/>
+          <a:lstStyle/>
+          <a:p>
+            <a:r>
+              <a:rPr lang="en-US" dirty="0"/>
+              <a:t>Random Forest</a:t>
+            </a:r>
+          </a:p>
+          <a:p>
+            <a:r>
+              <a:rPr lang="en-US" dirty="0"/>
+              <a:t>Logistic Regression</a:t>
+            </a:r>
+          </a:p>
+          <a:p>
+            <a:endParaRPr lang="en-US" dirty="0"/>
+          </a:p>
+          <a:p>
+            <a:pPr marL="0" indent="0">
+              <a:buNone/>
+            </a:pPr>
+            <a:r>
+              <a:rPr lang="en-US" sz="2400" dirty="0"/>
+              <a:t>Input features used for the model:</a:t>
+            </a:r>
+          </a:p>
+          <a:p>
+            <a:r>
+              <a:rPr lang="en-US" sz="1800" dirty="0"/>
+              <a:t>Description</a:t>
+            </a:r>
+          </a:p>
+          <a:p>
+            <a:r>
+              <a:rPr lang="en-US" sz="1800" dirty="0"/>
+              <a:t>Accident</a:t>
+            </a:r>
+          </a:p>
+          <a:p>
+            <a:r>
+              <a:rPr lang="en-US" sz="1800" dirty="0"/>
+              <a:t>Alcohol</a:t>
+            </a:r>
+          </a:p>
+          <a:p>
+            <a:r>
+              <a:rPr lang="en-US" sz="1800" dirty="0"/>
+              <a:t>Search Outcome</a:t>
+            </a:r>
+          </a:p>
+          <a:p>
+            <a:r>
+              <a:rPr lang="en-US" sz="1800" dirty="0"/>
+              <a:t>Violation Type</a:t>
+            </a:r>
+          </a:p>
+          <a:p>
+            <a:r>
+              <a:rPr lang="en-US" sz="1800" dirty="0"/>
+              <a:t>License Plate State Category</a:t>
+            </a:r>
+          </a:p>
+          <a:p>
+            <a:endParaRPr lang="en-US" sz="1800" dirty="0"/>
+          </a:p>
+          <a:p>
+            <a:pPr marL="0" indent="0">
+              <a:buNone/>
+            </a:pPr>
+            <a:r>
+              <a:rPr lang="en-US" sz="2400" dirty="0"/>
+              <a:t>Predicting value </a:t>
+            </a:r>
+            <a:r>
+              <a:rPr lang="en-US" sz="1800" dirty="0"/>
+              <a:t>: </a:t>
+            </a:r>
+          </a:p>
+          <a:p>
+            <a:r>
+              <a:rPr lang="en-US" sz="1800" dirty="0"/>
+              <a:t>Violation Type - [Citation/Warning]</a:t>
+            </a:r>
+          </a:p>
+          <a:p>
+            <a:endParaRPr lang="en-US" dirty="0"/>
+          </a:p>
+        </p:txBody>
+      </p:sp>
+    </p:spTree>
+    <p:extLst>
+      <p:ext uri="{BB962C8B-B14F-4D97-AF65-F5344CB8AC3E}">
+        <p14:creationId xmlns:p14="http://schemas.microsoft.com/office/powerpoint/2010/main" val="2208424213"/>
+      </p:ext>
+    </p:extLst>
+  </p:cSld>
+  <p:clrMapOvr>
+    <a:masterClrMapping/>
+  </p:clrMapOvr>
+</p:sld>
+</file>
+
+<file path=ppt/slides/slide7.xml><?xml version="1.0" encoding="utf-8"?>
+<p:sld xmlns:a="http://schemas.openxmlformats.org/drawingml/2006/main" xmlns:r="http://schemas.openxmlformats.org/officeDocument/2006/relationships" xmlns:p="http://schemas.openxmlformats.org/presentationml/2006/main">
+  <p:cSld>
+    <p:bg>
+      <p:bgPr>
+        <a:solidFill>
+          <a:schemeClr val="bg1"/>
+        </a:solidFill>
+        <a:effectLst/>
+      </p:bgPr>
+    </p:bg>
+    <p:spTree>
+      <p:nvGrpSpPr>
+        <p:cNvPr id="1" name=""/>
+        <p:cNvGrpSpPr/>
+        <p:nvPr/>
+      </p:nvGrpSpPr>
+      <p:grpSpPr>
+        <a:xfrm>
+          <a:off x="0" y="0"/>
+          <a:ext cx="0" cy="0"/>
+          <a:chOff x="0" y="0"/>
+          <a:chExt cx="0" cy="0"/>
+        </a:xfrm>
+      </p:grpSpPr>
+      <p:sp useBgFill="1">
+        <p:nvSpPr>
+          <p:cNvPr id="8" name="Rectangle 7">
+            <a:extLst>
+              <a:ext uri="{FF2B5EF4-FFF2-40B4-BE49-F238E27FC236}">
+                <a16:creationId xmlns:a16="http://schemas.microsoft.com/office/drawing/2014/main" id="{A8384FB5-9ADC-4DDC-881B-597D56F5B15D}"/>
+              </a:ext>
+              <a:ext uri="{C183D7F6-B498-43B3-948B-1728B52AA6E4}">
+                <adec:decorative xmlns:adec="http://schemas.microsoft.com/office/drawing/2017/decorative" val="1"/>
+              </a:ext>
+            </a:extLst>
+          </p:cNvPr>
+          <p:cNvSpPr>
+            <a:spLocks noGrp="1" noRot="1" noChangeAspect="1" noMove="1" noResize="1" noEditPoints="1" noAdjustHandles="1" noChangeArrowheads="1" noChangeShapeType="1" noTextEdit="1"/>
+          </p:cNvSpPr>
+          <p:nvPr>
+            <p:extLst>
+              <p:ext uri="{386F3935-93C4-4BCD-93E2-E3B085C9AB24}">
+                <p16:designElem xmlns:p16="http://schemas.microsoft.com/office/powerpoint/2015/main" val="1"/>
+              </p:ext>
+            </p:extLst>
+          </p:nvPr>
+        </p:nvSpPr>
+        <p:spPr>
+          <a:xfrm>
+            <a:off x="0" y="0"/>
+            <a:ext cx="9144000" cy="6858000"/>
+          </a:xfrm>
+          <a:prstGeom prst="rect">
+            <a:avLst/>
+          </a:prstGeom>
+          <a:ln w="12700" cap="flat" cmpd="sng" algn="ctr">
+            <a:noFill/>
+            <a:prstDash val="solid"/>
+            <a:miter lim="800000"/>
+          </a:ln>
+          <a:effectLst/>
+          <a:extLst>
+            <a:ext uri="{91240B29-F687-4F45-9708-019B960494DF}">
+              <a14:hiddenLine xmlns:a14="http://schemas.microsoft.com/office/drawing/2010/main" w="12700" cap="flat" cmpd="sng" algn="ctr">
+                <a:solidFill>
+                  <a:schemeClr val="accent1">
+                    <a:shade val="50000"/>
+                  </a:schemeClr>
+                </a:solidFill>
+                <a:prstDash val="solid"/>
+                <a:miter lim="800000"/>
+              </a14:hiddenLine>
+            </a:ext>
+          </a:extLst>
+        </p:spPr>
+        <p:style>
+          <a:lnRef idx="2">
+            <a:schemeClr val="accent1">
+              <a:shade val="50000"/>
+            </a:schemeClr>
+          </a:lnRef>
+          <a:fillRef idx="1">
+            <a:schemeClr val="accent1"/>
+          </a:fillRef>
+          <a:effectRef idx="0">
+            <a:schemeClr val="accent1"/>
+          </a:effectRef>
+          <a:fontRef idx="minor">
+            <a:schemeClr val="lt1"/>
+          </a:fontRef>
+        </p:style>
+        <p:txBody>
+          <a:bodyPr rtlCol="0" anchor="ctr"/>
+          <a:lstStyle/>
+          <a:p>
+            <a:pPr algn="ctr"/>
+            <a:endParaRPr lang="en-US"/>
+          </a:p>
+        </p:txBody>
+      </p:sp>
+      <p:sp>
+        <p:nvSpPr>
+          <p:cNvPr id="10" name="Rectangle 9">
+            <a:extLst>
+              <a:ext uri="{FF2B5EF4-FFF2-40B4-BE49-F238E27FC236}">
+                <a16:creationId xmlns:a16="http://schemas.microsoft.com/office/drawing/2014/main" id="{91E5A9A7-95C6-4F4F-B00E-C82E07FE62EF}"/>
+              </a:ext>
+              <a:ext uri="{C183D7F6-B498-43B3-948B-1728B52AA6E4}">
+                <adec:decorative xmlns:adec="http://schemas.microsoft.com/office/drawing/2017/decorative" val="1"/>
+              </a:ext>
+            </a:extLst>
+          </p:cNvPr>
+          <p:cNvSpPr>
+            <a:spLocks noGrp="1" noRot="1" noChangeAspect="1" noMove="1" noResize="1" noEditPoints="1" noAdjustHandles="1" noChangeArrowheads="1" noChangeShapeType="1" noTextEdit="1"/>
+          </p:cNvSpPr>
+          <p:nvPr>
+            <p:extLst>
+              <p:ext uri="{386F3935-93C4-4BCD-93E2-E3B085C9AB24}">
+                <p16:designElem xmlns:p16="http://schemas.microsoft.com/office/powerpoint/2015/main" val="1"/>
+              </p:ext>
+            </p:extLst>
+          </p:nvPr>
+        </p:nvSpPr>
+        <p:spPr>
+          <a:xfrm rot="5400000" flipH="1">
+            <a:off x="-1922632" y="1922631"/>
+            <a:ext cx="6875818" cy="3030558"/>
+          </a:xfrm>
+          <a:prstGeom prst="rect">
+            <a:avLst/>
+          </a:prstGeom>
+          <a:gradFill>
+            <a:gsLst>
+              <a:gs pos="0">
+                <a:srgbClr val="000000"/>
+              </a:gs>
+              <a:gs pos="100000">
+                <a:schemeClr val="accent1">
+                  <a:lumMod val="75000"/>
+                </a:schemeClr>
+              </a:gs>
+            </a:gsLst>
+            <a:lin ang="18600000" scaled="0"/>
+          </a:gradFill>
+          <a:ln>
+            <a:noFill/>
+          </a:ln>
+        </p:spPr>
+        <p:style>
+          <a:lnRef idx="2">
+            <a:schemeClr val="accent1">
+              <a:shade val="50000"/>
+            </a:schemeClr>
+          </a:lnRef>
+          <a:fillRef idx="1">
+            <a:schemeClr val="accent1"/>
+          </a:fillRef>
+          <a:effectRef idx="0">
+            <a:schemeClr val="accent1"/>
+          </a:effectRef>
+          <a:fontRef idx="minor">
+            <a:schemeClr val="lt1"/>
+          </a:fontRef>
+        </p:style>
+        <p:txBody>
+          <a:bodyPr rtlCol="0" anchor="ctr"/>
+          <a:lstStyle/>
+          <a:p>
+            <a:pPr algn="ctr"/>
+            <a:endParaRPr lang="en-US" dirty="0"/>
+          </a:p>
+        </p:txBody>
+      </p:sp>
+      <p:sp>
+        <p:nvSpPr>
+          <p:cNvPr id="12" name="Rectangle 11">
+            <a:extLst>
+              <a:ext uri="{FF2B5EF4-FFF2-40B4-BE49-F238E27FC236}">
+                <a16:creationId xmlns:a16="http://schemas.microsoft.com/office/drawing/2014/main" id="{D07DD2DE-F619-49DD-B5E7-03A290FF4ED1}"/>
+              </a:ext>
+              <a:ext uri="{C183D7F6-B498-43B3-948B-1728B52AA6E4}">
+                <adec:decorative xmlns:adec="http://schemas.microsoft.com/office/drawing/2017/decorative" val="1"/>
+              </a:ext>
+            </a:extLst>
+          </p:cNvPr>
+          <p:cNvSpPr>
+            <a:spLocks noGrp="1" noRot="1" noChangeAspect="1" noMove="1" noResize="1" noEditPoints="1" noAdjustHandles="1" noChangeArrowheads="1" noChangeShapeType="1" noTextEdit="1"/>
+          </p:cNvSpPr>
+          <p:nvPr>
+            <p:extLst>
+              <p:ext uri="{386F3935-93C4-4BCD-93E2-E3B085C9AB24}">
+                <p16:designElem xmlns:p16="http://schemas.microsoft.com/office/powerpoint/2015/main" val="1"/>
+              </p:ext>
+            </p:extLst>
+          </p:nvPr>
+        </p:nvSpPr>
+        <p:spPr>
+          <a:xfrm rot="16200000">
+            <a:off x="-663321" y="3165298"/>
+            <a:ext cx="4355594" cy="3028952"/>
+          </a:xfrm>
+          <a:prstGeom prst="rect">
+            <a:avLst/>
+          </a:prstGeom>
+          <a:gradFill>
+            <a:gsLst>
+              <a:gs pos="0">
+                <a:schemeClr val="accent1">
+                  <a:alpha val="50000"/>
+                </a:schemeClr>
+              </a:gs>
+              <a:gs pos="100000">
+                <a:schemeClr val="accent1">
+                  <a:lumMod val="50000"/>
+                  <a:alpha val="0"/>
+                </a:schemeClr>
+              </a:gs>
+            </a:gsLst>
+            <a:lin ang="11400000" scaled="0"/>
+          </a:gradFill>
+          <a:ln>
+            <a:noFill/>
+          </a:ln>
+        </p:spPr>
+        <p:style>
+          <a:lnRef idx="2">
+            <a:schemeClr val="accent1">
+              <a:shade val="50000"/>
+            </a:schemeClr>
+          </a:lnRef>
+          <a:fillRef idx="1">
+            <a:schemeClr val="accent1"/>
+          </a:fillRef>
+          <a:effectRef idx="0">
+            <a:schemeClr val="accent1"/>
+          </a:effectRef>
+          <a:fontRef idx="minor">
+            <a:schemeClr val="lt1"/>
+          </a:fontRef>
+        </p:style>
+        <p:txBody>
+          <a:bodyPr rtlCol="0" anchor="ctr"/>
+          <a:lstStyle/>
+          <a:p>
+            <a:pPr algn="ctr"/>
+            <a:endParaRPr lang="en-US"/>
+          </a:p>
+        </p:txBody>
+      </p:sp>
+      <p:sp>
+        <p:nvSpPr>
+          <p:cNvPr id="14" name="Rectangle 13">
+            <a:extLst>
+              <a:ext uri="{FF2B5EF4-FFF2-40B4-BE49-F238E27FC236}">
+                <a16:creationId xmlns:a16="http://schemas.microsoft.com/office/drawing/2014/main" id="{85149191-5F60-4A28-AAFF-039F96B0F3EC}"/>
+              </a:ext>
+              <a:ext uri="{C183D7F6-B498-43B3-948B-1728B52AA6E4}">
+                <adec:decorative xmlns:adec="http://schemas.microsoft.com/office/drawing/2017/decorative" val="1"/>
+              </a:ext>
+            </a:extLst>
+          </p:cNvPr>
+          <p:cNvSpPr>
+            <a:spLocks noGrp="1" noRot="1" noChangeAspect="1" noMove="1" noResize="1" noEditPoints="1" noAdjustHandles="1" noChangeArrowheads="1" noChangeShapeType="1" noTextEdit="1"/>
+          </p:cNvSpPr>
+          <p:nvPr>
+            <p:extLst>
+              <p:ext uri="{386F3935-93C4-4BCD-93E2-E3B085C9AB24}">
+                <p16:designElem xmlns:p16="http://schemas.microsoft.com/office/powerpoint/2015/main" val="1"/>
+              </p:ext>
+            </p:extLst>
+          </p:nvPr>
+        </p:nvSpPr>
+        <p:spPr>
+          <a:xfrm rot="16200000" flipH="1">
+            <a:off x="-1742858" y="2085760"/>
+            <a:ext cx="6857572" cy="2686051"/>
+          </a:xfrm>
+          <a:prstGeom prst="rect">
+            <a:avLst/>
+          </a:prstGeom>
+          <a:gradFill>
+            <a:gsLst>
+              <a:gs pos="0">
+                <a:srgbClr val="000000">
+                  <a:alpha val="59000"/>
+                </a:srgbClr>
+              </a:gs>
+              <a:gs pos="69000">
+                <a:schemeClr val="accent1">
+                  <a:alpha val="0"/>
+                </a:schemeClr>
+              </a:gs>
+            </a:gsLst>
+            <a:lin ang="13200000" scaled="0"/>
+          </a:gradFill>
+          <a:ln>
+            <a:noFill/>
+          </a:ln>
+        </p:spPr>
+        <p:style>
+          <a:lnRef idx="2">
+            <a:schemeClr val="accent1">
+              <a:shade val="50000"/>
+            </a:schemeClr>
+          </a:lnRef>
+          <a:fillRef idx="1">
+            <a:schemeClr val="accent1"/>
+          </a:fillRef>
+          <a:effectRef idx="0">
+            <a:schemeClr val="accent1"/>
+          </a:effectRef>
+          <a:fontRef idx="minor">
+            <a:schemeClr val="lt1"/>
+          </a:fontRef>
+        </p:style>
+        <p:txBody>
+          <a:bodyPr rtlCol="0" anchor="ctr"/>
+          <a:lstStyle/>
+          <a:p>
+            <a:pPr algn="ctr"/>
+            <a:endParaRPr lang="en-US" dirty="0"/>
+          </a:p>
+        </p:txBody>
+      </p:sp>
+      <p:sp>
+        <p:nvSpPr>
+          <p:cNvPr id="16" name="Freeform: Shape 15">
+            <a:extLst>
+              <a:ext uri="{FF2B5EF4-FFF2-40B4-BE49-F238E27FC236}">
+                <a16:creationId xmlns:a16="http://schemas.microsoft.com/office/drawing/2014/main" id="{F8260ED5-17F7-4158-B241-D51DD4CF1B7E}"/>
+              </a:ext>
+              <a:ext uri="{C183D7F6-B498-43B3-948B-1728B52AA6E4}">
+                <adec:decorative xmlns:adec="http://schemas.microsoft.com/office/drawing/2017/decorative" val="1"/>
+              </a:ext>
+            </a:extLst>
+          </p:cNvPr>
+          <p:cNvSpPr>
+            <a:spLocks noGrp="1" noRot="1" noChangeAspect="1" noMove="1" noResize="1" noEditPoints="1" noAdjustHandles="1" noChangeArrowheads="1" noChangeShapeType="1" noTextEdit="1"/>
+          </p:cNvSpPr>
+          <p:nvPr>
+            <p:extLst>
+              <p:ext uri="{386F3935-93C4-4BCD-93E2-E3B085C9AB24}">
+                <p16:designElem xmlns:p16="http://schemas.microsoft.com/office/powerpoint/2015/main" val="1"/>
+              </p:ext>
+            </p:extLst>
+          </p:nvPr>
+        </p:nvSpPr>
+        <p:spPr>
+          <a:xfrm rot="6097846">
+            <a:off x="-1161554" y="1712395"/>
+            <a:ext cx="4808302" cy="3066500"/>
+          </a:xfrm>
+          <a:custGeom>
+            <a:avLst/>
+            <a:gdLst>
+              <a:gd name="connsiteX0" fmla="*/ 48844 w 4808302"/>
+              <a:gd name="connsiteY0" fmla="*/ 2888671 h 4088666"/>
+              <a:gd name="connsiteX1" fmla="*/ 0 w 4808302"/>
+              <a:gd name="connsiteY1" fmla="*/ 2404151 h 4088666"/>
+              <a:gd name="connsiteX2" fmla="*/ 2404151 w 4808302"/>
+              <a:gd name="connsiteY2" fmla="*/ 0 h 4088666"/>
+              <a:gd name="connsiteX3" fmla="*/ 4808302 w 4808302"/>
+              <a:gd name="connsiteY3" fmla="*/ 2404151 h 4088666"/>
+              <a:gd name="connsiteX4" fmla="*/ 4700216 w 4808302"/>
+              <a:gd name="connsiteY4" fmla="*/ 3119072 h 4088666"/>
+              <a:gd name="connsiteX5" fmla="*/ 4643143 w 4808302"/>
+              <a:gd name="connsiteY5" fmla="*/ 3275009 h 4088666"/>
+              <a:gd name="connsiteX6" fmla="*/ 690093 w 4808302"/>
+              <a:gd name="connsiteY6" fmla="*/ 4088666 h 4088666"/>
+              <a:gd name="connsiteX7" fmla="*/ 548991 w 4808302"/>
+              <a:gd name="connsiteY7" fmla="*/ 3933414 h 4088666"/>
+              <a:gd name="connsiteX8" fmla="*/ 48844 w 4808302"/>
+              <a:gd name="connsiteY8" fmla="*/ 2888671 h 4088666"/>
+            </a:gdLst>
+            <a:ahLst/>
+            <a:cxnLst>
+              <a:cxn ang="0">
+                <a:pos x="connsiteX0" y="connsiteY0"/>
+              </a:cxn>
+              <a:cxn ang="0">
+                <a:pos x="connsiteX1" y="connsiteY1"/>
+              </a:cxn>
+              <a:cxn ang="0">
+                <a:pos x="connsiteX2" y="connsiteY2"/>
+              </a:cxn>
+              <a:cxn ang="0">
+                <a:pos x="connsiteX3" y="connsiteY3"/>
+              </a:cxn>
+              <a:cxn ang="0">
+                <a:pos x="connsiteX4" y="connsiteY4"/>
+              </a:cxn>
+              <a:cxn ang="0">
+                <a:pos x="connsiteX5" y="connsiteY5"/>
+              </a:cxn>
+              <a:cxn ang="0">
+                <a:pos x="connsiteX6" y="connsiteY6"/>
+              </a:cxn>
+              <a:cxn ang="0">
+                <a:pos x="connsiteX7" y="connsiteY7"/>
+              </a:cxn>
+              <a:cxn ang="0">
+                <a:pos x="connsiteX8" y="connsiteY8"/>
+              </a:cxn>
+            </a:cxnLst>
+            <a:rect l="l" t="t" r="r" b="b"/>
+            <a:pathLst>
+              <a:path w="4808302" h="4088666">
+                <a:moveTo>
+                  <a:pt x="48844" y="2888671"/>
+                </a:moveTo>
+                <a:cubicBezTo>
+                  <a:pt x="16818" y="2732167"/>
+                  <a:pt x="0" y="2570123"/>
+                  <a:pt x="0" y="2404151"/>
+                </a:cubicBezTo>
+                <a:cubicBezTo>
+                  <a:pt x="0" y="1076375"/>
+                  <a:pt x="1076375" y="0"/>
+                  <a:pt x="2404151" y="0"/>
+                </a:cubicBezTo>
+                <a:cubicBezTo>
+                  <a:pt x="3731927" y="0"/>
+                  <a:pt x="4808302" y="1076375"/>
+                  <a:pt x="4808302" y="2404151"/>
+                </a:cubicBezTo>
+                <a:cubicBezTo>
+                  <a:pt x="4808302" y="2653109"/>
+                  <a:pt x="4770461" y="2893229"/>
+                  <a:pt x="4700216" y="3119072"/>
+                </a:cubicBezTo>
+                <a:lnTo>
+                  <a:pt x="4643143" y="3275009"/>
+                </a:lnTo>
+                <a:lnTo>
+                  <a:pt x="690093" y="4088666"/>
+                </a:lnTo>
+                <a:lnTo>
+                  <a:pt x="548991" y="3933414"/>
+                </a:lnTo>
+                <a:cubicBezTo>
+                  <a:pt x="304015" y="3636572"/>
+                  <a:pt x="128908" y="3279932"/>
+                  <a:pt x="48844" y="2888671"/>
+                </a:cubicBezTo>
+                <a:close/>
+              </a:path>
+            </a:pathLst>
+          </a:custGeom>
+          <a:gradFill>
+            <a:gsLst>
+              <a:gs pos="39000">
+                <a:schemeClr val="accent1">
+                  <a:lumMod val="60000"/>
+                  <a:lumOff val="40000"/>
+                  <a:alpha val="0"/>
+                </a:schemeClr>
+              </a:gs>
+              <a:gs pos="100000">
+                <a:schemeClr val="accent1">
+                  <a:lumMod val="75000"/>
+                  <a:alpha val="26000"/>
+                </a:schemeClr>
+              </a:gs>
+            </a:gsLst>
+            <a:lin ang="18600000" scaled="0"/>
+          </a:gradFill>
+          <a:ln>
+            <a:noFill/>
+          </a:ln>
+        </p:spPr>
+        <p:style>
+          <a:lnRef idx="2">
+            <a:schemeClr val="accent1">
+              <a:shade val="50000"/>
+            </a:schemeClr>
+          </a:lnRef>
+          <a:fillRef idx="1">
+            <a:schemeClr val="accent1"/>
+          </a:fillRef>
+          <a:effectRef idx="0">
+            <a:schemeClr val="accent1"/>
+          </a:effectRef>
+          <a:fontRef idx="minor">
+            <a:schemeClr val="lt1"/>
+          </a:fontRef>
+        </p:style>
+        <p:txBody>
+          <a:bodyPr wrap="square" rtlCol="0" anchor="ctr">
+            <a:noAutofit/>
+          </a:bodyPr>
+          <a:lstStyle/>
+          <a:p>
+            <a:pPr algn="ctr"/>
+            <a:endParaRPr lang="en-US" dirty="0"/>
+          </a:p>
+        </p:txBody>
+      </p:sp>
+      <p:sp>
+        <p:nvSpPr>
+          <p:cNvPr id="2" name="Title 1">
+            <a:extLst>
+              <a:ext uri="{FF2B5EF4-FFF2-40B4-BE49-F238E27FC236}">
+                <a16:creationId xmlns:a16="http://schemas.microsoft.com/office/drawing/2014/main" id="{2D568483-CF48-E6E4-7E9C-C592AF0A47B5}"/>
+              </a:ext>
+            </a:extLst>
+          </p:cNvPr>
+          <p:cNvSpPr>
+            <a:spLocks noGrp="1"/>
+          </p:cNvSpPr>
+          <p:nvPr>
+            <p:ph type="title"/>
+          </p:nvPr>
+        </p:nvSpPr>
+        <p:spPr>
+          <a:xfrm>
+            <a:off x="495030" y="2767106"/>
+            <a:ext cx="2160621" cy="3071906"/>
+          </a:xfrm>
+        </p:spPr>
+        <p:txBody>
+          <a:bodyPr vert="horz" lIns="91440" tIns="45720" rIns="91440" bIns="45720" rtlCol="0" anchor="t">
+            <a:normAutofit/>
+          </a:bodyPr>
+          <a:lstStyle/>
+          <a:p>
+            <a:pPr>
+              <a:lnSpc>
+                <a:spcPct val="90000"/>
+              </a:lnSpc>
+            </a:pPr>
+            <a:r>
+              <a:rPr lang="en-US" sz="3500" kern="1200">
+                <a:solidFill>
+                  <a:srgbClr val="FFFFFF"/>
+                </a:solidFill>
+                <a:latin typeface="+mj-lt"/>
+                <a:ea typeface="+mj-ea"/>
+                <a:cs typeface="+mj-cs"/>
+              </a:rPr>
+              <a:t>Randon Forest - Results</a:t>
+            </a:r>
+          </a:p>
+        </p:txBody>
+      </p:sp>
+      <p:pic>
+        <p:nvPicPr>
+          <p:cNvPr id="3" name="Picture 2" descr="A screenshot of a computer screen&#10;&#10;Description automatically generated">
+            <a:extLst>
+              <a:ext uri="{FF2B5EF4-FFF2-40B4-BE49-F238E27FC236}">
+                <a16:creationId xmlns:a16="http://schemas.microsoft.com/office/drawing/2014/main" id="{38AAF441-D593-C532-84F1-38F4B560FA47}"/>
+              </a:ext>
+            </a:extLst>
+          </p:cNvPr>
+          <p:cNvPicPr>
+            <a:picLocks noChangeAspect="1"/>
+          </p:cNvPicPr>
+          <p:nvPr/>
+        </p:nvPicPr>
+        <p:blipFill>
+          <a:blip r:embed="rId2">
+            <a:extLst>
+              <a:ext uri="{28A0092B-C50C-407E-A947-70E740481C1C}">
+                <a14:useLocalDpi xmlns:a14="http://schemas.microsoft.com/office/drawing/2010/main" val="0"/>
+              </a:ext>
+            </a:extLst>
+          </a:blip>
+          <a:stretch>
+            <a:fillRect/>
+          </a:stretch>
+        </p:blipFill>
+        <p:spPr>
+          <a:xfrm>
+            <a:off x="3381787" y="2209800"/>
+            <a:ext cx="5419311" cy="4140609"/>
+          </a:xfrm>
+          <a:prstGeom prst="rect">
+            <a:avLst/>
+          </a:prstGeom>
+        </p:spPr>
+      </p:pic>
+      <p:sp>
+        <p:nvSpPr>
+          <p:cNvPr id="4" name="TextBox 3">
+            <a:extLst>
+              <a:ext uri="{FF2B5EF4-FFF2-40B4-BE49-F238E27FC236}">
+                <a16:creationId xmlns:a16="http://schemas.microsoft.com/office/drawing/2014/main" id="{9D31E4A2-7819-9BA6-6089-475409DDF0A6}"/>
+              </a:ext>
+            </a:extLst>
+          </p:cNvPr>
+          <p:cNvSpPr txBox="1"/>
+          <p:nvPr/>
+        </p:nvSpPr>
+        <p:spPr>
+          <a:xfrm>
+            <a:off x="3376821" y="581748"/>
+            <a:ext cx="5157579" cy="1415772"/>
+          </a:xfrm>
+          <a:prstGeom prst="rect">
+            <a:avLst/>
+          </a:prstGeom>
+          <a:noFill/>
+        </p:spPr>
+        <p:txBody>
+          <a:bodyPr wrap="square" rtlCol="0">
+            <a:spAutoFit/>
+          </a:bodyPr>
+          <a:lstStyle/>
+          <a:p>
+            <a:r>
+              <a:rPr lang="en-US" b="1" dirty="0">
+                <a:solidFill>
+                  <a:schemeClr val="accent1"/>
+                </a:solidFill>
+                <a:latin typeface="+mj-lt"/>
+              </a:rPr>
+              <a:t>Accuracy Score</a:t>
+            </a:r>
+            <a:r>
+              <a:rPr lang="en-US" dirty="0">
+                <a:latin typeface="+mj-lt"/>
+              </a:rPr>
+              <a:t>: </a:t>
+            </a:r>
+            <a:r>
+              <a:rPr lang="en-US" dirty="0">
+                <a:solidFill>
+                  <a:schemeClr val="accent1"/>
+                </a:solidFill>
+                <a:highlight>
+                  <a:srgbClr val="00FF00"/>
+                </a:highlight>
+                <a:latin typeface="+mj-lt"/>
+              </a:rPr>
+              <a:t>81.5%</a:t>
+            </a:r>
+          </a:p>
+          <a:p>
+            <a:pPr marL="285750" indent="-285750">
+              <a:buFont typeface="Wingdings" panose="05000000000000000000" pitchFamily="2" charset="2"/>
+              <a:buChar char="v"/>
+            </a:pPr>
+            <a:endParaRPr lang="en-US" dirty="0">
+              <a:latin typeface="+mj-lt"/>
+            </a:endParaRPr>
+          </a:p>
+          <a:p>
+            <a:pPr marL="285750" indent="-285750">
+              <a:buFont typeface="Wingdings" panose="05000000000000000000" pitchFamily="2" charset="2"/>
+              <a:buChar char="v"/>
+            </a:pPr>
+            <a:r>
+              <a:rPr lang="en-US" sz="1600" dirty="0">
+                <a:solidFill>
+                  <a:schemeClr val="accent1"/>
+                </a:solidFill>
+                <a:latin typeface="+mj-lt"/>
+              </a:rPr>
+              <a:t>Citation – Precision - </a:t>
+            </a:r>
+            <a:r>
+              <a:rPr lang="en-US" sz="1600" dirty="0">
+                <a:solidFill>
+                  <a:schemeClr val="accent1"/>
+                </a:solidFill>
+                <a:highlight>
+                  <a:srgbClr val="00FFFF"/>
+                </a:highlight>
+                <a:latin typeface="+mj-lt"/>
+              </a:rPr>
+              <a:t>85%</a:t>
+            </a:r>
+            <a:r>
+              <a:rPr lang="en-US" sz="1600" dirty="0">
+                <a:solidFill>
+                  <a:schemeClr val="accent1"/>
+                </a:solidFill>
+                <a:latin typeface="+mj-lt"/>
+              </a:rPr>
+              <a:t>, Recall – 73%</a:t>
+            </a:r>
+          </a:p>
+          <a:p>
+            <a:pPr marL="285750" indent="-285750">
+              <a:buFont typeface="Wingdings" panose="05000000000000000000" pitchFamily="2" charset="2"/>
+              <a:buChar char="v"/>
+            </a:pPr>
+            <a:r>
+              <a:rPr lang="en-US" sz="1600" dirty="0">
+                <a:solidFill>
+                  <a:schemeClr val="accent1"/>
+                </a:solidFill>
+                <a:latin typeface="+mj-lt"/>
+              </a:rPr>
+              <a:t>Warning - Precision - </a:t>
+            </a:r>
+            <a:r>
+              <a:rPr lang="en-US" sz="1600" dirty="0">
+                <a:solidFill>
+                  <a:schemeClr val="accent1"/>
+                </a:solidFill>
+                <a:highlight>
+                  <a:srgbClr val="00FFFF"/>
+                </a:highlight>
+                <a:latin typeface="+mj-lt"/>
+              </a:rPr>
+              <a:t>80%</a:t>
+            </a:r>
+            <a:r>
+              <a:rPr lang="en-US" sz="1600" dirty="0">
+                <a:solidFill>
+                  <a:schemeClr val="accent1"/>
+                </a:solidFill>
+                <a:latin typeface="+mj-lt"/>
+              </a:rPr>
+              <a:t>, Recall – 89%</a:t>
+            </a:r>
+          </a:p>
+          <a:p>
+            <a:endParaRPr lang="en-US" dirty="0"/>
+          </a:p>
+        </p:txBody>
+      </p:sp>
+    </p:spTree>
+    <p:extLst>
+      <p:ext uri="{BB962C8B-B14F-4D97-AF65-F5344CB8AC3E}">
+        <p14:creationId xmlns:p14="http://schemas.microsoft.com/office/powerpoint/2010/main" val="680655206"/>
+      </p:ext>
+    </p:extLst>
+  </p:cSld>
+  <p:clrMapOvr>
+    <a:masterClrMapping/>
+  </p:clrMapOvr>
+</p:sld>
+</file>
+
+<file path=ppt/slides/slide8.xml><?xml version="1.0" encoding="utf-8"?>
+<p:sld xmlns:a="http://schemas.openxmlformats.org/drawingml/2006/main" xmlns:r="http://schemas.openxmlformats.org/officeDocument/2006/relationships" xmlns:p="http://schemas.openxmlformats.org/presentationml/2006/main">
+  <p:cSld>
+    <p:bg>
+      <p:bgPr>
+        <a:solidFill>
+          <a:schemeClr val="bg1"/>
+        </a:solidFill>
+        <a:effectLst/>
+      </p:bgPr>
+    </p:bg>
+    <p:spTree>
+      <p:nvGrpSpPr>
+        <p:cNvPr id="1" name=""/>
+        <p:cNvGrpSpPr/>
+        <p:nvPr/>
+      </p:nvGrpSpPr>
+      <p:grpSpPr>
+        <a:xfrm>
+          <a:off x="0" y="0"/>
+          <a:ext cx="0" cy="0"/>
+          <a:chOff x="0" y="0"/>
+          <a:chExt cx="0" cy="0"/>
+        </a:xfrm>
+      </p:grpSpPr>
+      <p:sp useBgFill="1">
+        <p:nvSpPr>
+          <p:cNvPr id="8" name="Rectangle 7">
+            <a:extLst>
+              <a:ext uri="{FF2B5EF4-FFF2-40B4-BE49-F238E27FC236}">
+                <a16:creationId xmlns:a16="http://schemas.microsoft.com/office/drawing/2014/main" id="{A8384FB5-9ADC-4DDC-881B-597D56F5B15D}"/>
+              </a:ext>
+              <a:ext uri="{C183D7F6-B498-43B3-948B-1728B52AA6E4}">
+                <adec:decorative xmlns:adec="http://schemas.microsoft.com/office/drawing/2017/decorative" val="1"/>
+              </a:ext>
+            </a:extLst>
+          </p:cNvPr>
+          <p:cNvSpPr>
+            <a:spLocks noGrp="1" noRot="1" noChangeAspect="1" noMove="1" noResize="1" noEditPoints="1" noAdjustHandles="1" noChangeArrowheads="1" noChangeShapeType="1" noTextEdit="1"/>
+          </p:cNvSpPr>
+          <p:nvPr>
+            <p:extLst>
+              <p:ext uri="{386F3935-93C4-4BCD-93E2-E3B085C9AB24}">
+                <p16:designElem xmlns:p16="http://schemas.microsoft.com/office/powerpoint/2015/main" val="1"/>
+              </p:ext>
+            </p:extLst>
+          </p:nvPr>
+        </p:nvSpPr>
+        <p:spPr>
+          <a:xfrm>
+            <a:off x="0" y="0"/>
+            <a:ext cx="9144000" cy="6858000"/>
+          </a:xfrm>
+          <a:prstGeom prst="rect">
+            <a:avLst/>
+          </a:prstGeom>
+          <a:ln w="12700" cap="flat" cmpd="sng" algn="ctr">
+            <a:noFill/>
+            <a:prstDash val="solid"/>
+            <a:miter lim="800000"/>
+          </a:ln>
+          <a:effectLst/>
+          <a:extLst>
+            <a:ext uri="{91240B29-F687-4F45-9708-019B960494DF}">
+              <a14:hiddenLine xmlns:a14="http://schemas.microsoft.com/office/drawing/2010/main" w="12700" cap="flat" cmpd="sng" algn="ctr">
+                <a:solidFill>
+                  <a:schemeClr val="accent1">
+                    <a:shade val="50000"/>
+                  </a:schemeClr>
+                </a:solidFill>
+                <a:prstDash val="solid"/>
+                <a:miter lim="800000"/>
+              </a14:hiddenLine>
+            </a:ext>
+          </a:extLst>
+        </p:spPr>
+        <p:style>
+          <a:lnRef idx="2">
+            <a:schemeClr val="accent1">
+              <a:shade val="50000"/>
+            </a:schemeClr>
+          </a:lnRef>
+          <a:fillRef idx="1">
+            <a:schemeClr val="accent1"/>
+          </a:fillRef>
+          <a:effectRef idx="0">
+            <a:schemeClr val="accent1"/>
+          </a:effectRef>
+          <a:fontRef idx="minor">
+            <a:schemeClr val="lt1"/>
+          </a:fontRef>
+        </p:style>
+        <p:txBody>
+          <a:bodyPr rtlCol="0" anchor="ctr"/>
+          <a:lstStyle/>
+          <a:p>
+            <a:pPr algn="ctr"/>
+            <a:endParaRPr lang="en-US"/>
+          </a:p>
+        </p:txBody>
+      </p:sp>
+      <p:sp>
+        <p:nvSpPr>
+          <p:cNvPr id="10" name="Rectangle 9">
+            <a:extLst>
+              <a:ext uri="{FF2B5EF4-FFF2-40B4-BE49-F238E27FC236}">
+                <a16:creationId xmlns:a16="http://schemas.microsoft.com/office/drawing/2014/main" id="{91E5A9A7-95C6-4F4F-B00E-C82E07FE62EF}"/>
+              </a:ext>
+              <a:ext uri="{C183D7F6-B498-43B3-948B-1728B52AA6E4}">
+                <adec:decorative xmlns:adec="http://schemas.microsoft.com/office/drawing/2017/decorative" val="1"/>
+              </a:ext>
+            </a:extLst>
+          </p:cNvPr>
+          <p:cNvSpPr>
+            <a:spLocks noGrp="1" noRot="1" noChangeAspect="1" noMove="1" noResize="1" noEditPoints="1" noAdjustHandles="1" noChangeArrowheads="1" noChangeShapeType="1" noTextEdit="1"/>
+          </p:cNvSpPr>
+          <p:nvPr>
+            <p:extLst>
+              <p:ext uri="{386F3935-93C4-4BCD-93E2-E3B085C9AB24}">
+                <p16:designElem xmlns:p16="http://schemas.microsoft.com/office/powerpoint/2015/main" val="1"/>
+              </p:ext>
+            </p:extLst>
+          </p:nvPr>
+        </p:nvSpPr>
+        <p:spPr>
+          <a:xfrm rot="5400000" flipH="1">
+            <a:off x="-1922632" y="1922631"/>
+            <a:ext cx="6875818" cy="3030558"/>
+          </a:xfrm>
+          <a:prstGeom prst="rect">
+            <a:avLst/>
+          </a:prstGeom>
+          <a:gradFill>
+            <a:gsLst>
+              <a:gs pos="0">
+                <a:srgbClr val="000000"/>
+              </a:gs>
+              <a:gs pos="100000">
+                <a:schemeClr val="accent1">
+                  <a:lumMod val="75000"/>
+                </a:schemeClr>
+              </a:gs>
+            </a:gsLst>
+            <a:lin ang="18600000" scaled="0"/>
+          </a:gradFill>
+          <a:ln>
+            <a:noFill/>
+          </a:ln>
+        </p:spPr>
+        <p:style>
+          <a:lnRef idx="2">
+            <a:schemeClr val="accent1">
+              <a:shade val="50000"/>
+            </a:schemeClr>
+          </a:lnRef>
+          <a:fillRef idx="1">
+            <a:schemeClr val="accent1"/>
+          </a:fillRef>
+          <a:effectRef idx="0">
+            <a:schemeClr val="accent1"/>
+          </a:effectRef>
+          <a:fontRef idx="minor">
+            <a:schemeClr val="lt1"/>
+          </a:fontRef>
+        </p:style>
+        <p:txBody>
+          <a:bodyPr rtlCol="0" anchor="ctr"/>
+          <a:lstStyle/>
+          <a:p>
+            <a:pPr algn="ctr"/>
+            <a:endParaRPr lang="en-US" dirty="0"/>
+          </a:p>
+        </p:txBody>
+      </p:sp>
+      <p:sp>
+        <p:nvSpPr>
+          <p:cNvPr id="12" name="Rectangle 11">
+            <a:extLst>
+              <a:ext uri="{FF2B5EF4-FFF2-40B4-BE49-F238E27FC236}">
+                <a16:creationId xmlns:a16="http://schemas.microsoft.com/office/drawing/2014/main" id="{D07DD2DE-F619-49DD-B5E7-03A290FF4ED1}"/>
+              </a:ext>
+              <a:ext uri="{C183D7F6-B498-43B3-948B-1728B52AA6E4}">
+                <adec:decorative xmlns:adec="http://schemas.microsoft.com/office/drawing/2017/decorative" val="1"/>
+              </a:ext>
+            </a:extLst>
+          </p:cNvPr>
+          <p:cNvSpPr>
+            <a:spLocks noGrp="1" noRot="1" noChangeAspect="1" noMove="1" noResize="1" noEditPoints="1" noAdjustHandles="1" noChangeArrowheads="1" noChangeShapeType="1" noTextEdit="1"/>
+          </p:cNvSpPr>
+          <p:nvPr>
+            <p:extLst>
+              <p:ext uri="{386F3935-93C4-4BCD-93E2-E3B085C9AB24}">
+                <p16:designElem xmlns:p16="http://schemas.microsoft.com/office/powerpoint/2015/main" val="1"/>
+              </p:ext>
+            </p:extLst>
+          </p:nvPr>
+        </p:nvSpPr>
+        <p:spPr>
+          <a:xfrm rot="16200000">
+            <a:off x="-663321" y="3165298"/>
+            <a:ext cx="4355594" cy="3028952"/>
+          </a:xfrm>
+          <a:prstGeom prst="rect">
+            <a:avLst/>
+          </a:prstGeom>
+          <a:gradFill>
+            <a:gsLst>
+              <a:gs pos="0">
+                <a:schemeClr val="accent1">
+                  <a:alpha val="50000"/>
+                </a:schemeClr>
+              </a:gs>
+              <a:gs pos="100000">
+                <a:schemeClr val="accent1">
+                  <a:lumMod val="50000"/>
+                  <a:alpha val="0"/>
+                </a:schemeClr>
+              </a:gs>
+            </a:gsLst>
+            <a:lin ang="11400000" scaled="0"/>
+          </a:gradFill>
+          <a:ln>
+            <a:noFill/>
+          </a:ln>
+        </p:spPr>
+        <p:style>
+          <a:lnRef idx="2">
+            <a:schemeClr val="accent1">
+              <a:shade val="50000"/>
+            </a:schemeClr>
+          </a:lnRef>
+          <a:fillRef idx="1">
+            <a:schemeClr val="accent1"/>
+          </a:fillRef>
+          <a:effectRef idx="0">
+            <a:schemeClr val="accent1"/>
+          </a:effectRef>
+          <a:fontRef idx="minor">
+            <a:schemeClr val="lt1"/>
+          </a:fontRef>
+        </p:style>
+        <p:txBody>
+          <a:bodyPr rtlCol="0" anchor="ctr"/>
+          <a:lstStyle/>
+          <a:p>
+            <a:pPr algn="ctr"/>
+            <a:endParaRPr lang="en-US"/>
+          </a:p>
+        </p:txBody>
+      </p:sp>
+      <p:sp>
+        <p:nvSpPr>
+          <p:cNvPr id="14" name="Rectangle 13">
+            <a:extLst>
+              <a:ext uri="{FF2B5EF4-FFF2-40B4-BE49-F238E27FC236}">
+                <a16:creationId xmlns:a16="http://schemas.microsoft.com/office/drawing/2014/main" id="{85149191-5F60-4A28-AAFF-039F96B0F3EC}"/>
+              </a:ext>
+              <a:ext uri="{C183D7F6-B498-43B3-948B-1728B52AA6E4}">
+                <adec:decorative xmlns:adec="http://schemas.microsoft.com/office/drawing/2017/decorative" val="1"/>
+              </a:ext>
+            </a:extLst>
+          </p:cNvPr>
+          <p:cNvSpPr>
+            <a:spLocks noGrp="1" noRot="1" noChangeAspect="1" noMove="1" noResize="1" noEditPoints="1" noAdjustHandles="1" noChangeArrowheads="1" noChangeShapeType="1" noTextEdit="1"/>
+          </p:cNvSpPr>
+          <p:nvPr>
+            <p:extLst>
+              <p:ext uri="{386F3935-93C4-4BCD-93E2-E3B085C9AB24}">
+                <p16:designElem xmlns:p16="http://schemas.microsoft.com/office/powerpoint/2015/main" val="1"/>
+              </p:ext>
+            </p:extLst>
+          </p:nvPr>
+        </p:nvSpPr>
+        <p:spPr>
+          <a:xfrm rot="16200000" flipH="1">
+            <a:off x="-1742858" y="2085760"/>
+            <a:ext cx="6857572" cy="2686051"/>
+          </a:xfrm>
+          <a:prstGeom prst="rect">
+            <a:avLst/>
+          </a:prstGeom>
+          <a:gradFill>
+            <a:gsLst>
+              <a:gs pos="0">
+                <a:srgbClr val="000000">
+                  <a:alpha val="59000"/>
+                </a:srgbClr>
+              </a:gs>
+              <a:gs pos="69000">
+                <a:schemeClr val="accent1">
+                  <a:alpha val="0"/>
+                </a:schemeClr>
+              </a:gs>
+            </a:gsLst>
+            <a:lin ang="13200000" scaled="0"/>
+          </a:gradFill>
+          <a:ln>
+            <a:noFill/>
+          </a:ln>
+        </p:spPr>
+        <p:style>
+          <a:lnRef idx="2">
+            <a:schemeClr val="accent1">
+              <a:shade val="50000"/>
+            </a:schemeClr>
+          </a:lnRef>
+          <a:fillRef idx="1">
+            <a:schemeClr val="accent1"/>
+          </a:fillRef>
+          <a:effectRef idx="0">
+            <a:schemeClr val="accent1"/>
+          </a:effectRef>
+          <a:fontRef idx="minor">
+            <a:schemeClr val="lt1"/>
+          </a:fontRef>
+        </p:style>
+        <p:txBody>
+          <a:bodyPr rtlCol="0" anchor="ctr"/>
+          <a:lstStyle/>
+          <a:p>
+            <a:pPr algn="ctr"/>
+            <a:endParaRPr lang="en-US" dirty="0"/>
+          </a:p>
+        </p:txBody>
+      </p:sp>
+      <p:sp>
+        <p:nvSpPr>
+          <p:cNvPr id="16" name="Freeform: Shape 15">
+            <a:extLst>
+              <a:ext uri="{FF2B5EF4-FFF2-40B4-BE49-F238E27FC236}">
+                <a16:creationId xmlns:a16="http://schemas.microsoft.com/office/drawing/2014/main" id="{F8260ED5-17F7-4158-B241-D51DD4CF1B7E}"/>
+              </a:ext>
+              <a:ext uri="{C183D7F6-B498-43B3-948B-1728B52AA6E4}">
+                <adec:decorative xmlns:adec="http://schemas.microsoft.com/office/drawing/2017/decorative" val="1"/>
+              </a:ext>
+            </a:extLst>
+          </p:cNvPr>
+          <p:cNvSpPr>
+            <a:spLocks noGrp="1" noRot="1" noChangeAspect="1" noMove="1" noResize="1" noEditPoints="1" noAdjustHandles="1" noChangeArrowheads="1" noChangeShapeType="1" noTextEdit="1"/>
+          </p:cNvSpPr>
+          <p:nvPr>
+            <p:extLst>
+              <p:ext uri="{386F3935-93C4-4BCD-93E2-E3B085C9AB24}">
+                <p16:designElem xmlns:p16="http://schemas.microsoft.com/office/powerpoint/2015/main" val="1"/>
+              </p:ext>
+            </p:extLst>
+          </p:nvPr>
+        </p:nvSpPr>
+        <p:spPr>
+          <a:xfrm rot="6097846">
+            <a:off x="-1161554" y="1712395"/>
+            <a:ext cx="4808302" cy="3066500"/>
+          </a:xfrm>
+          <a:custGeom>
+            <a:avLst/>
+            <a:gdLst>
+              <a:gd name="connsiteX0" fmla="*/ 48844 w 4808302"/>
+              <a:gd name="connsiteY0" fmla="*/ 2888671 h 4088666"/>
+              <a:gd name="connsiteX1" fmla="*/ 0 w 4808302"/>
+              <a:gd name="connsiteY1" fmla="*/ 2404151 h 4088666"/>
+              <a:gd name="connsiteX2" fmla="*/ 2404151 w 4808302"/>
+              <a:gd name="connsiteY2" fmla="*/ 0 h 4088666"/>
+              <a:gd name="connsiteX3" fmla="*/ 4808302 w 4808302"/>
+              <a:gd name="connsiteY3" fmla="*/ 2404151 h 4088666"/>
+              <a:gd name="connsiteX4" fmla="*/ 4700216 w 4808302"/>
+              <a:gd name="connsiteY4" fmla="*/ 3119072 h 4088666"/>
+              <a:gd name="connsiteX5" fmla="*/ 4643143 w 4808302"/>
+              <a:gd name="connsiteY5" fmla="*/ 3275009 h 4088666"/>
+              <a:gd name="connsiteX6" fmla="*/ 690093 w 4808302"/>
+              <a:gd name="connsiteY6" fmla="*/ 4088666 h 4088666"/>
+              <a:gd name="connsiteX7" fmla="*/ 548991 w 4808302"/>
+              <a:gd name="connsiteY7" fmla="*/ 3933414 h 4088666"/>
+              <a:gd name="connsiteX8" fmla="*/ 48844 w 4808302"/>
+              <a:gd name="connsiteY8" fmla="*/ 2888671 h 4088666"/>
+            </a:gdLst>
+            <a:ahLst/>
+            <a:cxnLst>
+              <a:cxn ang="0">
+                <a:pos x="connsiteX0" y="connsiteY0"/>
+              </a:cxn>
+              <a:cxn ang="0">
+                <a:pos x="connsiteX1" y="connsiteY1"/>
+              </a:cxn>
+              <a:cxn ang="0">
+                <a:pos x="connsiteX2" y="connsiteY2"/>
+              </a:cxn>
+              <a:cxn ang="0">
+                <a:pos x="connsiteX3" y="connsiteY3"/>
+              </a:cxn>
+              <a:cxn ang="0">
+                <a:pos x="connsiteX4" y="connsiteY4"/>
+              </a:cxn>
+              <a:cxn ang="0">
+                <a:pos x="connsiteX5" y="connsiteY5"/>
+              </a:cxn>
+              <a:cxn ang="0">
+                <a:pos x="connsiteX6" y="connsiteY6"/>
+              </a:cxn>
+              <a:cxn ang="0">
+                <a:pos x="connsiteX7" y="connsiteY7"/>
+              </a:cxn>
+              <a:cxn ang="0">
+                <a:pos x="connsiteX8" y="connsiteY8"/>
+              </a:cxn>
+            </a:cxnLst>
+            <a:rect l="l" t="t" r="r" b="b"/>
+            <a:pathLst>
+              <a:path w="4808302" h="4088666">
+                <a:moveTo>
+                  <a:pt x="48844" y="2888671"/>
+                </a:moveTo>
+                <a:cubicBezTo>
+                  <a:pt x="16818" y="2732167"/>
+                  <a:pt x="0" y="2570123"/>
+                  <a:pt x="0" y="2404151"/>
+                </a:cubicBezTo>
+                <a:cubicBezTo>
+                  <a:pt x="0" y="1076375"/>
+                  <a:pt x="1076375" y="0"/>
+                  <a:pt x="2404151" y="0"/>
+                </a:cubicBezTo>
+                <a:cubicBezTo>
+                  <a:pt x="3731927" y="0"/>
+                  <a:pt x="4808302" y="1076375"/>
+                  <a:pt x="4808302" y="2404151"/>
+                </a:cubicBezTo>
+                <a:cubicBezTo>
+                  <a:pt x="4808302" y="2653109"/>
+                  <a:pt x="4770461" y="2893229"/>
+                  <a:pt x="4700216" y="3119072"/>
+                </a:cubicBezTo>
+                <a:lnTo>
+                  <a:pt x="4643143" y="3275009"/>
+                </a:lnTo>
+                <a:lnTo>
+                  <a:pt x="690093" y="4088666"/>
+                </a:lnTo>
+                <a:lnTo>
+                  <a:pt x="548991" y="3933414"/>
+                </a:lnTo>
+                <a:cubicBezTo>
+                  <a:pt x="304015" y="3636572"/>
+                  <a:pt x="128908" y="3279932"/>
+                  <a:pt x="48844" y="2888671"/>
+                </a:cubicBezTo>
+                <a:close/>
+              </a:path>
+            </a:pathLst>
+          </a:custGeom>
+          <a:gradFill>
+            <a:gsLst>
+              <a:gs pos="39000">
+                <a:schemeClr val="accent1">
+                  <a:lumMod val="60000"/>
+                  <a:lumOff val="40000"/>
+                  <a:alpha val="0"/>
+                </a:schemeClr>
+              </a:gs>
+              <a:gs pos="100000">
+                <a:schemeClr val="accent1">
+                  <a:lumMod val="75000"/>
+                  <a:alpha val="26000"/>
+                </a:schemeClr>
+              </a:gs>
+            </a:gsLst>
+            <a:lin ang="18600000" scaled="0"/>
+          </a:gradFill>
+          <a:ln>
+            <a:noFill/>
+          </a:ln>
+        </p:spPr>
+        <p:style>
+          <a:lnRef idx="2">
+            <a:schemeClr val="accent1">
+              <a:shade val="50000"/>
+            </a:schemeClr>
+          </a:lnRef>
+          <a:fillRef idx="1">
+            <a:schemeClr val="accent1"/>
+          </a:fillRef>
+          <a:effectRef idx="0">
+            <a:schemeClr val="accent1"/>
+          </a:effectRef>
+          <a:fontRef idx="minor">
+            <a:schemeClr val="lt1"/>
+          </a:fontRef>
+        </p:style>
+        <p:txBody>
+          <a:bodyPr wrap="square" rtlCol="0" anchor="ctr">
+            <a:noAutofit/>
+          </a:bodyPr>
+          <a:lstStyle/>
+          <a:p>
+            <a:pPr algn="ctr"/>
+            <a:endParaRPr lang="en-US" dirty="0"/>
+          </a:p>
+        </p:txBody>
+      </p:sp>
+      <p:sp>
+        <p:nvSpPr>
+          <p:cNvPr id="2" name="Title 1">
+            <a:extLst>
+              <a:ext uri="{FF2B5EF4-FFF2-40B4-BE49-F238E27FC236}">
+                <a16:creationId xmlns:a16="http://schemas.microsoft.com/office/drawing/2014/main" id="{71C267FA-B449-5930-7251-0B0D1AAB2C4B}"/>
+              </a:ext>
+            </a:extLst>
+          </p:cNvPr>
+          <p:cNvSpPr>
+            <a:spLocks noGrp="1"/>
+          </p:cNvSpPr>
+          <p:nvPr>
+            <p:ph type="title"/>
+          </p:nvPr>
+        </p:nvSpPr>
+        <p:spPr>
+          <a:xfrm>
+            <a:off x="495030" y="2767106"/>
+            <a:ext cx="2160621" cy="3071906"/>
+          </a:xfrm>
+        </p:spPr>
+        <p:txBody>
+          <a:bodyPr vert="horz" lIns="91440" tIns="45720" rIns="91440" bIns="45720" rtlCol="0" anchor="t">
+            <a:normAutofit/>
+          </a:bodyPr>
+          <a:lstStyle/>
+          <a:p>
+            <a:pPr>
+              <a:lnSpc>
+                <a:spcPct val="90000"/>
+              </a:lnSpc>
+            </a:pPr>
+            <a:r>
+              <a:rPr lang="en-US" sz="2700" kern="1200">
+                <a:solidFill>
+                  <a:srgbClr val="FFFFFF"/>
+                </a:solidFill>
+                <a:latin typeface="+mj-lt"/>
+                <a:ea typeface="+mj-ea"/>
+                <a:cs typeface="+mj-cs"/>
+              </a:rPr>
+              <a:t>Logistic Regression Model</a:t>
+            </a:r>
+          </a:p>
+        </p:txBody>
+      </p:sp>
+      <p:pic>
+        <p:nvPicPr>
+          <p:cNvPr id="3" name="Picture 2" descr="A screenshot of a computer screen&#10;&#10;Description automatically generated">
+            <a:extLst>
+              <a:ext uri="{FF2B5EF4-FFF2-40B4-BE49-F238E27FC236}">
+                <a16:creationId xmlns:a16="http://schemas.microsoft.com/office/drawing/2014/main" id="{34A59F63-84EC-AD24-29C4-8C6CD2E8BC97}"/>
+              </a:ext>
+            </a:extLst>
+          </p:cNvPr>
+          <p:cNvPicPr>
+            <a:picLocks noChangeAspect="1"/>
+          </p:cNvPicPr>
+          <p:nvPr/>
+        </p:nvPicPr>
+        <p:blipFill>
+          <a:blip r:embed="rId2">
+            <a:extLst>
+              <a:ext uri="{28A0092B-C50C-407E-A947-70E740481C1C}">
+                <a14:useLocalDpi xmlns:a14="http://schemas.microsoft.com/office/drawing/2010/main" val="0"/>
+              </a:ext>
+            </a:extLst>
+          </a:blip>
+          <a:stretch>
+            <a:fillRect/>
+          </a:stretch>
+        </p:blipFill>
+        <p:spPr>
+          <a:xfrm>
+            <a:off x="3407187" y="2362200"/>
+            <a:ext cx="5419311" cy="4121972"/>
+          </a:xfrm>
+          <a:prstGeom prst="rect">
+            <a:avLst/>
+          </a:prstGeom>
+        </p:spPr>
+      </p:pic>
+      <p:sp>
+        <p:nvSpPr>
+          <p:cNvPr id="5" name="TextBox 4">
+            <a:extLst>
+              <a:ext uri="{FF2B5EF4-FFF2-40B4-BE49-F238E27FC236}">
+                <a16:creationId xmlns:a16="http://schemas.microsoft.com/office/drawing/2014/main" id="{3ACA0DA2-FBBA-C93F-B3F4-3B5E11909B22}"/>
+              </a:ext>
+            </a:extLst>
+          </p:cNvPr>
+          <p:cNvSpPr txBox="1"/>
+          <p:nvPr/>
+        </p:nvSpPr>
+        <p:spPr>
+          <a:xfrm>
+            <a:off x="3407187" y="685800"/>
+            <a:ext cx="4812253" cy="1477328"/>
+          </a:xfrm>
+          <a:prstGeom prst="rect">
+            <a:avLst/>
+          </a:prstGeom>
+          <a:noFill/>
+        </p:spPr>
+        <p:txBody>
+          <a:bodyPr wrap="square" rtlCol="0">
+            <a:spAutoFit/>
+          </a:bodyPr>
+          <a:lstStyle/>
+          <a:p>
+            <a:r>
+              <a:rPr lang="en-US" b="1" dirty="0">
+                <a:solidFill>
+                  <a:schemeClr val="accent1"/>
+                </a:solidFill>
+                <a:latin typeface="+mj-lt"/>
+              </a:rPr>
+              <a:t>Accuracy Score</a:t>
+            </a:r>
+            <a:r>
+              <a:rPr lang="en-US" dirty="0">
+                <a:latin typeface="+mj-lt"/>
+              </a:rPr>
+              <a:t>: </a:t>
+            </a:r>
+            <a:r>
+              <a:rPr lang="en-US" dirty="0">
+                <a:solidFill>
+                  <a:schemeClr val="accent1"/>
+                </a:solidFill>
+                <a:highlight>
+                  <a:srgbClr val="00FF00"/>
+                </a:highlight>
+                <a:latin typeface="+mj-lt"/>
+              </a:rPr>
+              <a:t>81.3%</a:t>
+            </a:r>
+          </a:p>
+          <a:p>
+            <a:pPr marL="285750" indent="-285750">
+              <a:buFont typeface="Wingdings" panose="05000000000000000000" pitchFamily="2" charset="2"/>
+              <a:buChar char="v"/>
+            </a:pPr>
+            <a:endParaRPr lang="en-US" dirty="0">
+              <a:latin typeface="+mj-lt"/>
+            </a:endParaRPr>
+          </a:p>
+          <a:p>
+            <a:pPr marL="285750" indent="-285750">
+              <a:buFont typeface="Wingdings" panose="05000000000000000000" pitchFamily="2" charset="2"/>
+              <a:buChar char="v"/>
+            </a:pPr>
+            <a:r>
+              <a:rPr lang="en-US" sz="1800" dirty="0">
+                <a:solidFill>
+                  <a:schemeClr val="accent1"/>
+                </a:solidFill>
+                <a:latin typeface="+mj-lt"/>
+              </a:rPr>
+              <a:t>Citation – Precision - </a:t>
+            </a:r>
+            <a:r>
+              <a:rPr lang="en-US" sz="1800" dirty="0">
+                <a:solidFill>
+                  <a:schemeClr val="accent1"/>
+                </a:solidFill>
+                <a:highlight>
+                  <a:srgbClr val="00FFFF"/>
+                </a:highlight>
+                <a:latin typeface="+mj-lt"/>
+              </a:rPr>
+              <a:t>84%</a:t>
+            </a:r>
+            <a:r>
+              <a:rPr lang="en-US" sz="1800" dirty="0">
+                <a:solidFill>
+                  <a:schemeClr val="accent1"/>
+                </a:solidFill>
+                <a:latin typeface="+mj-lt"/>
+              </a:rPr>
+              <a:t>, Recall – 78%</a:t>
+            </a:r>
+          </a:p>
+          <a:p>
+            <a:pPr marL="285750" indent="-285750">
+              <a:buFont typeface="Wingdings" panose="05000000000000000000" pitchFamily="2" charset="2"/>
+              <a:buChar char="v"/>
+            </a:pPr>
+            <a:r>
+              <a:rPr lang="en-US" sz="1800" dirty="0">
+                <a:solidFill>
+                  <a:schemeClr val="accent1"/>
+                </a:solidFill>
+                <a:latin typeface="+mj-lt"/>
+              </a:rPr>
+              <a:t>Warning - Precision - </a:t>
+            </a:r>
+            <a:r>
+              <a:rPr lang="en-US" dirty="0">
+                <a:solidFill>
+                  <a:schemeClr val="accent1"/>
+                </a:solidFill>
+                <a:highlight>
+                  <a:srgbClr val="00FFFF"/>
+                </a:highlight>
+                <a:latin typeface="+mj-lt"/>
+              </a:rPr>
+              <a:t>79</a:t>
+            </a:r>
+            <a:r>
+              <a:rPr lang="en-US" sz="1800" dirty="0">
+                <a:solidFill>
+                  <a:schemeClr val="accent1"/>
+                </a:solidFill>
+                <a:highlight>
+                  <a:srgbClr val="00FFFF"/>
+                </a:highlight>
+                <a:latin typeface="+mj-lt"/>
+              </a:rPr>
+              <a:t>%</a:t>
+            </a:r>
+            <a:r>
+              <a:rPr lang="en-US" sz="1800" dirty="0">
+                <a:solidFill>
+                  <a:schemeClr val="accent1"/>
+                </a:solidFill>
+                <a:latin typeface="+mj-lt"/>
+              </a:rPr>
+              <a:t>, Recall – 84%</a:t>
+            </a:r>
+          </a:p>
+          <a:p>
+            <a:endParaRPr lang="en-US" dirty="0"/>
+          </a:p>
+        </p:txBody>
+      </p:sp>
+    </p:spTree>
+    <p:extLst>
+      <p:ext uri="{BB962C8B-B14F-4D97-AF65-F5344CB8AC3E}">
+        <p14:creationId xmlns:p14="http://schemas.microsoft.com/office/powerpoint/2010/main" val="3033160867"/>
+      </p:ext>
+    </p:extLst>
+  </p:cSld>
+  <p:clrMapOvr>
+    <a:masterClrMapping/>
+  </p:clrMapOvr>
+</p:sld>
+</file>
+
+<file path=ppt/slides/slide9.xml><?xml version="1.0" encoding="utf-8"?>
+<p:sld xmlns:a="http://schemas.openxmlformats.org/drawingml/2006/main" xmlns:r="http://schemas.openxmlformats.org/officeDocument/2006/relationships" xmlns:p="http://schemas.openxmlformats.org/presentationml/2006/main">
+  <p:cSld>
+    <p:spTree>
+      <p:nvGrpSpPr>
+        <p:cNvPr id="1" name=""/>
+        <p:cNvGrpSpPr/>
+        <p:nvPr/>
+      </p:nvGrpSpPr>
+      <p:grpSpPr>
+        <a:xfrm>
+          <a:off x="0" y="0"/>
+          <a:ext cx="0" cy="0"/>
+          <a:chOff x="0" y="0"/>
+          <a:chExt cx="0" cy="0"/>
+        </a:xfrm>
+      </p:grpSpPr>
+      <p:sp>
+        <p:nvSpPr>
+          <p:cNvPr id="2" name="Title 1">
+            <a:extLst>
+              <a:ext uri="{FF2B5EF4-FFF2-40B4-BE49-F238E27FC236}">
+                <a16:creationId xmlns:a16="http://schemas.microsoft.com/office/drawing/2014/main" id="{8E961674-242D-F048-BCB8-0DE82029DD70}"/>
+              </a:ext>
+            </a:extLst>
+          </p:cNvPr>
+          <p:cNvSpPr>
+            <a:spLocks noGrp="1"/>
+          </p:cNvSpPr>
+          <p:nvPr>
+            <p:ph type="title"/>
+          </p:nvPr>
+        </p:nvSpPr>
+        <p:spPr/>
+        <p:txBody>
+          <a:bodyPr/>
+          <a:lstStyle/>
+          <a:p>
+            <a:r>
+              <a:rPr lang="en-US" dirty="0" err="1"/>
+              <a:t>Pyspark</a:t>
+            </a:r>
+            <a:endParaRPr lang="en-US" dirty="0"/>
+          </a:p>
+        </p:txBody>
+      </p:sp>
+      <p:sp>
+        <p:nvSpPr>
+          <p:cNvPr id="3" name="Text Placeholder 2">
+            <a:extLst>
+              <a:ext uri="{FF2B5EF4-FFF2-40B4-BE49-F238E27FC236}">
+                <a16:creationId xmlns:a16="http://schemas.microsoft.com/office/drawing/2014/main" id="{A801A934-091D-FC2E-EAB0-68400EC103B3}"/>
+              </a:ext>
+            </a:extLst>
+          </p:cNvPr>
+          <p:cNvSpPr>
+            <a:spLocks noGrp="1"/>
+          </p:cNvSpPr>
+          <p:nvPr>
+            <p:ph type="body" idx="1"/>
+          </p:nvPr>
+        </p:nvSpPr>
+        <p:spPr>
+          <a:xfrm>
+            <a:off x="630239" y="1681163"/>
+            <a:ext cx="2874962" cy="452437"/>
+          </a:xfrm>
+        </p:spPr>
+        <p:txBody>
+          <a:bodyPr/>
+          <a:lstStyle/>
+          <a:p>
+            <a:r>
+              <a:rPr lang="en-US" dirty="0"/>
+              <a:t>Without Partition</a:t>
+            </a:r>
+          </a:p>
+        </p:txBody>
+      </p:sp>
+      <p:sp>
+        <p:nvSpPr>
+          <p:cNvPr id="4" name="Content Placeholder 3">
+            <a:extLst>
+              <a:ext uri="{FF2B5EF4-FFF2-40B4-BE49-F238E27FC236}">
+                <a16:creationId xmlns:a16="http://schemas.microsoft.com/office/drawing/2014/main" id="{0C42304B-88CA-7AFB-2FDB-0A7A5004EB2C}"/>
+              </a:ext>
+            </a:extLst>
+          </p:cNvPr>
+          <p:cNvSpPr>
+            <a:spLocks noGrp="1"/>
+          </p:cNvSpPr>
+          <p:nvPr>
+            <p:ph sz="half" idx="2"/>
+          </p:nvPr>
+        </p:nvSpPr>
+        <p:spPr>
+          <a:xfrm>
+            <a:off x="630239" y="2057400"/>
+            <a:ext cx="3332162" cy="4435475"/>
+          </a:xfrm>
+        </p:spPr>
+        <p:txBody>
+          <a:bodyPr/>
+          <a:lstStyle/>
+          <a:p>
+            <a:endParaRPr lang="en-US" sz="2400" dirty="0"/>
+          </a:p>
+          <a:p>
+            <a:r>
+              <a:rPr lang="en-US" sz="2400" dirty="0"/>
+              <a:t>To get number of incidents for each description for each violation type: </a:t>
+            </a:r>
+            <a:r>
+              <a:rPr lang="en-US" sz="2400" dirty="0">
+                <a:highlight>
+                  <a:srgbClr val="FF9900"/>
+                </a:highlight>
+              </a:rPr>
+              <a:t>6.8 Seconds</a:t>
+            </a:r>
+          </a:p>
+          <a:p>
+            <a:r>
+              <a:rPr lang="en-US" sz="2400" dirty="0"/>
+              <a:t>To get 25 locations with highest citations of "Speeding" recently: </a:t>
+            </a:r>
+            <a:r>
+              <a:rPr lang="en-US" sz="2400" dirty="0">
+                <a:highlight>
+                  <a:srgbClr val="FF9900"/>
+                </a:highlight>
+              </a:rPr>
+              <a:t>5.9 Seconds</a:t>
+            </a:r>
+          </a:p>
+        </p:txBody>
+      </p:sp>
+      <p:sp>
+        <p:nvSpPr>
+          <p:cNvPr id="5" name="Text Placeholder 4">
+            <a:extLst>
+              <a:ext uri="{FF2B5EF4-FFF2-40B4-BE49-F238E27FC236}">
+                <a16:creationId xmlns:a16="http://schemas.microsoft.com/office/drawing/2014/main" id="{3E0AE967-5144-9B6A-8CF9-E91F5B73A1BC}"/>
+              </a:ext>
+            </a:extLst>
+          </p:cNvPr>
+          <p:cNvSpPr>
+            <a:spLocks noGrp="1"/>
+          </p:cNvSpPr>
+          <p:nvPr>
+            <p:ph type="body" sz="quarter" idx="3"/>
+          </p:nvPr>
+        </p:nvSpPr>
+        <p:spPr>
+          <a:xfrm>
+            <a:off x="3962401" y="1681163"/>
+            <a:ext cx="4554537" cy="452437"/>
+          </a:xfrm>
+        </p:spPr>
+        <p:txBody>
+          <a:bodyPr/>
+          <a:lstStyle/>
+          <a:p>
+            <a:r>
+              <a:rPr lang="en-US" dirty="0"/>
+              <a:t>With Partition on </a:t>
+            </a:r>
+            <a:r>
+              <a:rPr lang="en-US" dirty="0" err="1"/>
+              <a:t>Descritpion</a:t>
+            </a:r>
+            <a:endParaRPr lang="en-US" dirty="0"/>
+          </a:p>
+        </p:txBody>
+      </p:sp>
+      <p:sp>
+        <p:nvSpPr>
+          <p:cNvPr id="6" name="Content Placeholder 5">
+            <a:extLst>
+              <a:ext uri="{FF2B5EF4-FFF2-40B4-BE49-F238E27FC236}">
+                <a16:creationId xmlns:a16="http://schemas.microsoft.com/office/drawing/2014/main" id="{92A75458-5193-83CD-07AB-4ADF3FA34095}"/>
+              </a:ext>
+            </a:extLst>
+          </p:cNvPr>
+          <p:cNvSpPr>
+            <a:spLocks noGrp="1"/>
+          </p:cNvSpPr>
+          <p:nvPr>
+            <p:ph sz="quarter" idx="4"/>
+          </p:nvPr>
+        </p:nvSpPr>
+        <p:spPr>
+          <a:xfrm>
+            <a:off x="4631053" y="2436812"/>
+            <a:ext cx="3887788" cy="4056063"/>
+          </a:xfrm>
+        </p:spPr>
+        <p:txBody>
+          <a:bodyPr/>
+          <a:lstStyle/>
+          <a:p>
+            <a:r>
+              <a:rPr lang="en-US" sz="2400" dirty="0"/>
+              <a:t>To get number of incidents for each description for each violation type: </a:t>
+            </a:r>
+            <a:r>
+              <a:rPr lang="en-US" sz="2400" dirty="0">
+                <a:highlight>
+                  <a:srgbClr val="00FF00"/>
+                </a:highlight>
+              </a:rPr>
+              <a:t>2.1 Seconds</a:t>
+            </a:r>
+          </a:p>
+          <a:p>
+            <a:r>
+              <a:rPr lang="en-US" sz="2400" dirty="0"/>
+              <a:t>To get 25 locations with highest citations of "Speeding" recently: </a:t>
+            </a:r>
+            <a:r>
+              <a:rPr lang="en-US" sz="2400" dirty="0">
+                <a:highlight>
+                  <a:srgbClr val="00FF00"/>
+                </a:highlight>
+              </a:rPr>
+              <a:t>1.6 Seconds</a:t>
+            </a:r>
+          </a:p>
+          <a:p>
+            <a:endParaRPr lang="en-US" dirty="0"/>
+          </a:p>
+        </p:txBody>
+      </p:sp>
+    </p:spTree>
+    <p:extLst>
+      <p:ext uri="{BB962C8B-B14F-4D97-AF65-F5344CB8AC3E}">
+        <p14:creationId xmlns:p14="http://schemas.microsoft.com/office/powerpoint/2010/main" val="657106904"/>
+      </p:ext>
+    </p:extLst>
   </p:cSld>
   <p:clrMapOvr>
     <a:masterClrMapping/>

</xml_diff>

<commit_message>
Updated labels in ML model output
</commit_message>
<xml_diff>
--- a/traffic_violation.pptx
+++ b/traffic_violation.pptx
@@ -4773,42 +4773,6 @@
           </a:p>
         </p:txBody>
       </p:sp>
-      <p:pic>
-        <p:nvPicPr>
-          <p:cNvPr id="3" name="Picture 2" descr="A screenshot of a computer screen&#10;&#10;Description automatically generated">
-            <a:extLst>
-              <a:ext uri="{FF2B5EF4-FFF2-40B4-BE49-F238E27FC236}">
-                <a16:creationId xmlns:a16="http://schemas.microsoft.com/office/drawing/2014/main" id="{38AAF441-D593-C532-84F1-38F4B560FA47}"/>
-              </a:ext>
-            </a:extLst>
-          </p:cNvPr>
-          <p:cNvPicPr>
-            <a:picLocks noChangeAspect="1"/>
-          </p:cNvPicPr>
-          <p:nvPr/>
-        </p:nvPicPr>
-        <p:blipFill>
-          <a:blip r:embed="rId2">
-            <a:extLst>
-              <a:ext uri="{28A0092B-C50C-407E-A947-70E740481C1C}">
-                <a14:useLocalDpi xmlns:a14="http://schemas.microsoft.com/office/drawing/2010/main" val="0"/>
-              </a:ext>
-            </a:extLst>
-          </a:blip>
-          <a:stretch>
-            <a:fillRect/>
-          </a:stretch>
-        </p:blipFill>
-        <p:spPr>
-          <a:xfrm>
-            <a:off x="3381787" y="2209800"/>
-            <a:ext cx="5419311" cy="4140609"/>
-          </a:xfrm>
-          <a:prstGeom prst="rect">
-            <a:avLst/>
-          </a:prstGeom>
-        </p:spPr>
-      </p:pic>
       <p:sp>
         <p:nvSpPr>
           <p:cNvPr id="4" name="TextBox 3">
@@ -4951,6 +4915,36 @@
           </a:p>
         </p:txBody>
       </p:sp>
+      <p:pic>
+        <p:nvPicPr>
+          <p:cNvPr id="6" name="Picture 5">
+            <a:extLst>
+              <a:ext uri="{FF2B5EF4-FFF2-40B4-BE49-F238E27FC236}">
+                <a16:creationId xmlns:a16="http://schemas.microsoft.com/office/drawing/2014/main" id="{DFD8836A-E4EC-9EA3-290C-E7B04D2CD8D0}"/>
+              </a:ext>
+            </a:extLst>
+          </p:cNvPr>
+          <p:cNvPicPr>
+            <a:picLocks noChangeAspect="1"/>
+          </p:cNvPicPr>
+          <p:nvPr/>
+        </p:nvPicPr>
+        <p:blipFill>
+          <a:blip r:embed="rId2"/>
+          <a:stretch>
+            <a:fillRect/>
+          </a:stretch>
+        </p:blipFill>
+        <p:spPr>
+          <a:xfrm>
+            <a:off x="3571954" y="2362200"/>
+            <a:ext cx="4733846" cy="3914052"/>
+          </a:xfrm>
+          <a:prstGeom prst="rect">
+            <a:avLst/>
+          </a:prstGeom>
+        </p:spPr>
+      </p:pic>
     </p:spTree>
     <p:extLst>
       <p:ext uri="{BB962C8B-B14F-4D97-AF65-F5344CB8AC3E}">
@@ -5509,42 +5503,6 @@
           </a:p>
         </p:txBody>
       </p:sp>
-      <p:pic>
-        <p:nvPicPr>
-          <p:cNvPr id="3" name="Picture 2" descr="A screenshot of a computer screen&#10;&#10;Description automatically generated">
-            <a:extLst>
-              <a:ext uri="{FF2B5EF4-FFF2-40B4-BE49-F238E27FC236}">
-                <a16:creationId xmlns:a16="http://schemas.microsoft.com/office/drawing/2014/main" id="{34A59F63-84EC-AD24-29C4-8C6CD2E8BC97}"/>
-              </a:ext>
-            </a:extLst>
-          </p:cNvPr>
-          <p:cNvPicPr>
-            <a:picLocks noChangeAspect="1"/>
-          </p:cNvPicPr>
-          <p:nvPr/>
-        </p:nvPicPr>
-        <p:blipFill>
-          <a:blip r:embed="rId2">
-            <a:extLst>
-              <a:ext uri="{28A0092B-C50C-407E-A947-70E740481C1C}">
-                <a14:useLocalDpi xmlns:a14="http://schemas.microsoft.com/office/drawing/2010/main" val="0"/>
-              </a:ext>
-            </a:extLst>
-          </a:blip>
-          <a:stretch>
-            <a:fillRect/>
-          </a:stretch>
-        </p:blipFill>
-        <p:spPr>
-          <a:xfrm>
-            <a:off x="3407187" y="2362200"/>
-            <a:ext cx="5419311" cy="4121972"/>
-          </a:xfrm>
-          <a:prstGeom prst="rect">
-            <a:avLst/>
-          </a:prstGeom>
-        </p:spPr>
-      </p:pic>
       <p:sp>
         <p:nvSpPr>
           <p:cNvPr id="5" name="TextBox 4">
@@ -5643,7 +5601,7 @@
                 </a:solidFill>
                 <a:latin typeface="+mj-lt"/>
               </a:rPr>
-              <a:t>, Recall – 78%</a:t>
+              <a:t>, Recall – 73%</a:t>
             </a:r>
           </a:p>
           <a:p>
@@ -5691,7 +5649,7 @@
                 </a:solidFill>
                 <a:latin typeface="+mj-lt"/>
               </a:rPr>
-              <a:t>, Recall – 84%</a:t>
+              <a:t>, Recall – 89%</a:t>
             </a:r>
           </a:p>
           <a:p>
@@ -5699,6 +5657,36 @@
           </a:p>
         </p:txBody>
       </p:sp>
+      <p:pic>
+        <p:nvPicPr>
+          <p:cNvPr id="6" name="Picture 5">
+            <a:extLst>
+              <a:ext uri="{FF2B5EF4-FFF2-40B4-BE49-F238E27FC236}">
+                <a16:creationId xmlns:a16="http://schemas.microsoft.com/office/drawing/2014/main" id="{502B7FA6-C99A-8FA5-4708-F3D06FD3E354}"/>
+              </a:ext>
+            </a:extLst>
+          </p:cNvPr>
+          <p:cNvPicPr>
+            <a:picLocks noChangeAspect="1"/>
+          </p:cNvPicPr>
+          <p:nvPr/>
+        </p:nvPicPr>
+        <p:blipFill>
+          <a:blip r:embed="rId2"/>
+          <a:stretch>
+            <a:fillRect/>
+          </a:stretch>
+        </p:blipFill>
+        <p:spPr>
+          <a:xfrm>
+            <a:off x="3743105" y="2501977"/>
+            <a:ext cx="4812253" cy="3465987"/>
+          </a:xfrm>
+          <a:prstGeom prst="rect">
+            <a:avLst/>
+          </a:prstGeom>
+        </p:spPr>
+      </p:pic>
     </p:spTree>
     <p:extLst>
       <p:ext uri="{BB962C8B-B14F-4D97-AF65-F5344CB8AC3E}">
@@ -5809,16 +5797,13 @@
         </p:nvSpPr>
         <p:spPr>
           <a:xfrm>
-            <a:off x="630239" y="2057400"/>
-            <a:ext cx="3332162" cy="4435475"/>
+            <a:off x="630238" y="2240756"/>
+            <a:ext cx="3484562" cy="3702844"/>
           </a:xfrm>
         </p:spPr>
         <p:txBody>
           <a:bodyPr/>
           <a:lstStyle/>
-          <a:p>
-            <a:endParaRPr lang="en-US" sz="2400" dirty="0"/>
-          </a:p>
           <a:p>
             <a:r>
               <a:rPr lang="en-US" sz="2400" dirty="0"/>
@@ -5900,8 +5885,8 @@
         </p:nvSpPr>
         <p:spPr>
           <a:xfrm>
-            <a:off x="4631053" y="2436812"/>
-            <a:ext cx="3887788" cy="4056063"/>
+            <a:off x="4625973" y="2270124"/>
+            <a:ext cx="3887788" cy="3506788"/>
           </a:xfrm>
         </p:spPr>
         <p:txBody>
@@ -5937,6 +5922,49 @@
           </a:p>
           <a:p>
             <a:endParaRPr lang="en-US" dirty="0"/>
+          </a:p>
+        </p:txBody>
+      </p:sp>
+      <p:sp>
+        <p:nvSpPr>
+          <p:cNvPr id="8" name="TextBox 7">
+            <a:extLst>
+              <a:ext uri="{FF2B5EF4-FFF2-40B4-BE49-F238E27FC236}">
+                <a16:creationId xmlns:a16="http://schemas.microsoft.com/office/drawing/2014/main" id="{96AF2C5F-83BF-A62A-20A5-A5CC99A86ED7}"/>
+              </a:ext>
+            </a:extLst>
+          </p:cNvPr>
+          <p:cNvSpPr txBox="1"/>
+          <p:nvPr/>
+        </p:nvSpPr>
+        <p:spPr>
+          <a:xfrm>
+            <a:off x="457200" y="6172200"/>
+            <a:ext cx="7886700" cy="369332"/>
+          </a:xfrm>
+          <a:prstGeom prst="rect">
+            <a:avLst/>
+          </a:prstGeom>
+          <a:noFill/>
+        </p:spPr>
+        <p:txBody>
+          <a:bodyPr wrap="square" rtlCol="0">
+            <a:spAutoFit/>
+          </a:bodyPr>
+          <a:lstStyle/>
+          <a:p>
+            <a:r>
+              <a:rPr lang="en-US" sz="1400" b="1" dirty="0"/>
+              <a:t>Note</a:t>
+            </a:r>
+            <a:r>
+              <a:rPr lang="en-US" sz="1400" dirty="0"/>
+              <a:t>: The seconds may slightly vary each time the query is executed</a:t>
+            </a:r>
+            <a:r>
+              <a:rPr lang="en-US" dirty="0"/>
+              <a:t>.</a:t>
+            </a:r>
           </a:p>
         </p:txBody>
       </p:sp>

</xml_diff>

<commit_message>
fixed vehicle year chart
</commit_message>
<xml_diff>
--- a/traffic_violation.pptx
+++ b/traffic_violation.pptx
@@ -3918,10 +3918,10 @@
       </p:sp>
       <p:pic>
         <p:nvPicPr>
-          <p:cNvPr id="4" name="slide19" descr="Total Violations by Year">
-            <a:extLst>
-              <a:ext uri="{FF2B5EF4-FFF2-40B4-BE49-F238E27FC236}">
-                <a16:creationId xmlns:a16="http://schemas.microsoft.com/office/drawing/2014/main" id="{F4576103-72C4-0483-3E54-38EBF244939C}"/>
+          <p:cNvPr id="6" name="Content Placeholder 5">
+            <a:extLst>
+              <a:ext uri="{FF2B5EF4-FFF2-40B4-BE49-F238E27FC236}">
+                <a16:creationId xmlns:a16="http://schemas.microsoft.com/office/drawing/2014/main" id="{B84CCAA1-E0DC-F29B-DEE9-9F2DEC4930C4}"/>
               </a:ext>
             </a:extLst>
           </p:cNvPr>
@@ -3933,25 +3933,16 @@
           </p:nvPr>
         </p:nvPicPr>
         <p:blipFill>
-          <a:blip r:embed="rId2">
-            <a:extLst>
-              <a:ext uri="{28A0092B-C50C-407E-A947-70E740481C1C}">
-                <a14:useLocalDpi xmlns:a14="http://schemas.microsoft.com/office/drawing/2010/main" val="0"/>
-              </a:ext>
-            </a:extLst>
-          </a:blip>
+          <a:blip r:embed="rId2"/>
           <a:stretch>
             <a:fillRect/>
           </a:stretch>
         </p:blipFill>
         <p:spPr>
           <a:xfrm>
-            <a:off x="1265577" y="1268413"/>
-            <a:ext cx="7478033" cy="4968875"/>
-          </a:xfrm>
-          <a:prstGeom prst="rect">
-            <a:avLst/>
-          </a:prstGeom>
+            <a:off x="304800" y="1697041"/>
+            <a:ext cx="8678926" cy="3865559"/>
+          </a:xfrm>
         </p:spPr>
       </p:pic>
     </p:spTree>

</xml_diff>

<commit_message>
added information to the ppt
</commit_message>
<xml_diff>
--- a/traffic_violation.pptx
+++ b/traffic_violation.pptx
@@ -5,10 +5,10 @@
     <p:sldMasterId id="2147483648" r:id="rId1"/>
   </p:sldMasterIdLst>
   <p:notesMasterIdLst>
-    <p:notesMasterId r:id="rId23"/>
+    <p:notesMasterId r:id="rId22"/>
   </p:notesMasterIdLst>
   <p:handoutMasterIdLst>
-    <p:handoutMasterId r:id="rId24"/>
+    <p:handoutMasterId r:id="rId23"/>
   </p:handoutMasterIdLst>
   <p:sldIdLst>
     <p:sldId id="256" r:id="rId2"/>
@@ -29,9 +29,8 @@
     <p:sldId id="272" r:id="rId17"/>
     <p:sldId id="273" r:id="rId18"/>
     <p:sldId id="271" r:id="rId19"/>
-    <p:sldId id="261" r:id="rId20"/>
-    <p:sldId id="262" r:id="rId21"/>
-    <p:sldId id="258" r:id="rId22"/>
+    <p:sldId id="262" r:id="rId20"/>
+    <p:sldId id="258" r:id="rId21"/>
   </p:sldIdLst>
   <p:sldSz cx="9144000" cy="6858000" type="screen4x3"/>
   <p:notesSz cx="6858000" cy="9144000"/>
@@ -5991,72 +5990,101 @@
       </p:grpSpPr>
       <p:sp>
         <p:nvSpPr>
-          <p:cNvPr id="114690" name="Rectangle 2">
-            <a:extLst>
-              <a:ext uri="{FF2B5EF4-FFF2-40B4-BE49-F238E27FC236}">
-                <a16:creationId xmlns:a16="http://schemas.microsoft.com/office/drawing/2014/main" id="{E38F1BDF-7654-66E1-0814-7A6BC9C85A34}"/>
+          <p:cNvPr id="2" name="Title 1">
+            <a:extLst>
+              <a:ext uri="{FF2B5EF4-FFF2-40B4-BE49-F238E27FC236}">
+                <a16:creationId xmlns:a16="http://schemas.microsoft.com/office/drawing/2014/main" id="{65F70101-2480-4920-3D6F-424F65D6E233}"/>
               </a:ext>
             </a:extLst>
           </p:cNvPr>
           <p:cNvSpPr>
-            <a:spLocks noGrp="1" noChangeArrowheads="1"/>
+            <a:spLocks noGrp="1"/>
           </p:cNvSpPr>
           <p:nvPr>
             <p:ph type="title"/>
           </p:nvPr>
         </p:nvSpPr>
-        <p:spPr>
-          <a:xfrm>
-            <a:off x="1871663" y="188913"/>
-            <a:ext cx="7092950" cy="647700"/>
-          </a:xfrm>
-        </p:spPr>
+        <p:spPr/>
         <p:txBody>
           <a:bodyPr/>
           <a:lstStyle/>
           <a:p>
-            <a:endParaRPr lang="en-US" altLang="en-US">
-              <a:solidFill>
-                <a:schemeClr val="tx1"/>
-              </a:solidFill>
-            </a:endParaRPr>
+            <a:pPr algn="ctr"/>
+            <a:r>
+              <a:rPr lang="en-US" dirty="0"/>
+              <a:t>Room for Improvement</a:t>
+            </a:r>
           </a:p>
         </p:txBody>
       </p:sp>
       <p:sp>
         <p:nvSpPr>
-          <p:cNvPr id="114691" name="Rectangle 3">
-            <a:extLst>
-              <a:ext uri="{FF2B5EF4-FFF2-40B4-BE49-F238E27FC236}">
-                <a16:creationId xmlns:a16="http://schemas.microsoft.com/office/drawing/2014/main" id="{C532EC86-DEA2-C8B9-0652-CDA52A320F51}"/>
+          <p:cNvPr id="3" name="Content Placeholder 2">
+            <a:extLst>
+              <a:ext uri="{FF2B5EF4-FFF2-40B4-BE49-F238E27FC236}">
+                <a16:creationId xmlns:a16="http://schemas.microsoft.com/office/drawing/2014/main" id="{27E4D1F4-BC64-FC19-216E-265BDA4AEDA4}"/>
               </a:ext>
             </a:extLst>
           </p:cNvPr>
           <p:cNvSpPr>
-            <a:spLocks noGrp="1" noChangeArrowheads="1"/>
+            <a:spLocks noGrp="1"/>
           </p:cNvSpPr>
           <p:nvPr>
-            <p:ph type="body" idx="1"/>
+            <p:ph idx="1"/>
           </p:nvPr>
         </p:nvSpPr>
-        <p:spPr>
-          <a:xfrm>
-            <a:off x="1860550" y="908050"/>
-            <a:ext cx="7104063" cy="5761038"/>
-          </a:xfrm>
-        </p:spPr>
+        <p:spPr/>
         <p:txBody>
           <a:bodyPr/>
           <a:lstStyle/>
           <a:p>
-            <a:endParaRPr lang="en-US" altLang="en-US"/>
+            <a:r>
+              <a:rPr lang="en-US" dirty="0"/>
+              <a:t>Get Description and Make columns even more uniform.</a:t>
+            </a:r>
+          </a:p>
+          <a:p>
+            <a:r>
+              <a:rPr lang="en-US" dirty="0"/>
+              <a:t>Use Big Data tactics to tackle our data better.</a:t>
+            </a:r>
+          </a:p>
+          <a:p>
+            <a:r>
+              <a:rPr lang="en-US" dirty="0"/>
+              <a:t>More statistical analysis between features.</a:t>
+            </a:r>
+          </a:p>
+          <a:p>
+            <a:r>
+              <a:rPr lang="en-US" dirty="0"/>
+              <a:t>Test out more models of machine learning.</a:t>
+            </a:r>
+          </a:p>
+          <a:p>
+            <a:r>
+              <a:rPr lang="en-US" dirty="0"/>
+              <a:t>Look at time series data. </a:t>
+            </a:r>
+          </a:p>
+          <a:p>
+            <a:r>
+              <a:rPr lang="en-US" dirty="0"/>
+              <a:t>Test out more combinations of features.</a:t>
+            </a:r>
+          </a:p>
+          <a:p>
+            <a:r>
+              <a:rPr lang="en-US" dirty="0"/>
+              <a:t>Target a feature to see what other predictions we could do.</a:t>
+            </a:r>
           </a:p>
         </p:txBody>
       </p:sp>
     </p:spTree>
     <p:extLst>
       <p:ext uri="{BB962C8B-B14F-4D97-AF65-F5344CB8AC3E}">
-        <p14:creationId xmlns:p14="http://schemas.microsoft.com/office/powerpoint/2010/main" val="1936378657"/>
+        <p14:creationId xmlns:p14="http://schemas.microsoft.com/office/powerpoint/2010/main" val="3089617898"/>
       </p:ext>
     </p:extLst>
   </p:cSld>
@@ -6219,86 +6247,6 @@
 <file path=ppt/slides/slide20.xml><?xml version="1.0" encoding="utf-8"?>
 <p:sld xmlns:a="http://schemas.openxmlformats.org/drawingml/2006/main" xmlns:r="http://schemas.openxmlformats.org/officeDocument/2006/relationships" xmlns:p="http://schemas.openxmlformats.org/presentationml/2006/main">
   <p:cSld>
-    <p:spTree>
-      <p:nvGrpSpPr>
-        <p:cNvPr id="1" name=""/>
-        <p:cNvGrpSpPr/>
-        <p:nvPr/>
-      </p:nvGrpSpPr>
-      <p:grpSpPr>
-        <a:xfrm>
-          <a:off x="0" y="0"/>
-          <a:ext cx="0" cy="0"/>
-          <a:chOff x="0" y="0"/>
-          <a:chExt cx="0" cy="0"/>
-        </a:xfrm>
-      </p:grpSpPr>
-      <p:sp>
-        <p:nvSpPr>
-          <p:cNvPr id="2" name="Title 1">
-            <a:extLst>
-              <a:ext uri="{FF2B5EF4-FFF2-40B4-BE49-F238E27FC236}">
-                <a16:creationId xmlns:a16="http://schemas.microsoft.com/office/drawing/2014/main" id="{65F70101-2480-4920-3D6F-424F65D6E233}"/>
-              </a:ext>
-            </a:extLst>
-          </p:cNvPr>
-          <p:cNvSpPr>
-            <a:spLocks noGrp="1"/>
-          </p:cNvSpPr>
-          <p:nvPr>
-            <p:ph type="title"/>
-          </p:nvPr>
-        </p:nvSpPr>
-        <p:spPr/>
-        <p:txBody>
-          <a:bodyPr/>
-          <a:lstStyle/>
-          <a:p>
-            <a:endParaRPr lang="en-US"/>
-          </a:p>
-        </p:txBody>
-      </p:sp>
-      <p:sp>
-        <p:nvSpPr>
-          <p:cNvPr id="3" name="Content Placeholder 2">
-            <a:extLst>
-              <a:ext uri="{FF2B5EF4-FFF2-40B4-BE49-F238E27FC236}">
-                <a16:creationId xmlns:a16="http://schemas.microsoft.com/office/drawing/2014/main" id="{27E4D1F4-BC64-FC19-216E-265BDA4AEDA4}"/>
-              </a:ext>
-            </a:extLst>
-          </p:cNvPr>
-          <p:cNvSpPr>
-            <a:spLocks noGrp="1"/>
-          </p:cNvSpPr>
-          <p:nvPr>
-            <p:ph idx="1"/>
-          </p:nvPr>
-        </p:nvSpPr>
-        <p:spPr/>
-        <p:txBody>
-          <a:bodyPr/>
-          <a:lstStyle/>
-          <a:p>
-            <a:endParaRPr lang="en-US"/>
-          </a:p>
-        </p:txBody>
-      </p:sp>
-    </p:spTree>
-    <p:extLst>
-      <p:ext uri="{BB962C8B-B14F-4D97-AF65-F5344CB8AC3E}">
-        <p14:creationId xmlns:p14="http://schemas.microsoft.com/office/powerpoint/2010/main" val="3089617898"/>
-      </p:ext>
-    </p:extLst>
-  </p:cSld>
-  <p:clrMapOvr>
-    <a:masterClrMapping/>
-  </p:clrMapOvr>
-</p:sld>
-</file>
-
-<file path=ppt/slides/slide21.xml><?xml version="1.0" encoding="utf-8"?>
-<p:sld xmlns:a="http://schemas.openxmlformats.org/drawingml/2006/main" xmlns:r="http://schemas.openxmlformats.org/officeDocument/2006/relationships" xmlns:p="http://schemas.openxmlformats.org/presentationml/2006/main">
-  <p:cSld>
     <p:bg>
       <p:bgPr>
         <a:solidFill>
@@ -6342,7 +6290,7 @@
         </p:blipFill>
         <p:spPr>
           <a:xfrm>
-            <a:off x="20" y="10"/>
+            <a:off x="-228600" y="33885"/>
             <a:ext cx="9143980" cy="6857990"/>
           </a:xfrm>
           <a:prstGeom prst="rect">
@@ -6433,7 +6381,7 @@
         </p:nvSpPr>
         <p:spPr>
           <a:xfrm>
-            <a:off x="152400" y="152400"/>
+            <a:off x="304800" y="1905000"/>
             <a:ext cx="8408194" cy="744836"/>
           </a:xfrm>
         </p:spPr>
@@ -6449,7 +6397,7 @@
               </a:lnSpc>
             </a:pPr>
             <a:r>
-              <a:rPr lang="en-US" altLang="en-US" sz="3100" dirty="0">
+              <a:rPr lang="en-US" altLang="en-US" sz="4400" dirty="0">
                 <a:solidFill>
                   <a:schemeClr val="tx1">
                     <a:lumMod val="85000"/>
@@ -6666,7 +6614,7 @@
           <a:p>
             <a:r>
               <a:rPr lang="en-US" sz="2000" dirty="0"/>
-              <a:t>Updated Daily.</a:t>
+              <a:t>The dataset was pulled on November 16, 2023.</a:t>
             </a:r>
             <a:endParaRPr lang="en-US" dirty="0"/>
           </a:p>
@@ -6784,7 +6732,7 @@
         </p:nvSpPr>
         <p:spPr>
           <a:xfrm>
-            <a:off x="1025525" y="2438400"/>
+            <a:off x="1025525" y="1752600"/>
             <a:ext cx="7092950" cy="647700"/>
           </a:xfrm>
         </p:spPr>
@@ -6804,6 +6752,51 @@
           </a:p>
         </p:txBody>
       </p:sp>
+      <p:pic>
+        <p:nvPicPr>
+          <p:cNvPr id="1026" name="Picture 2" descr="12 Cleaning Tools Every Home Needs | 2023 | Bungalow">
+            <a:extLst>
+              <a:ext uri="{FF2B5EF4-FFF2-40B4-BE49-F238E27FC236}">
+                <a16:creationId xmlns:a16="http://schemas.microsoft.com/office/drawing/2014/main" id="{9AD15FA7-6806-CAF6-190A-CE24F29BD203}"/>
+              </a:ext>
+            </a:extLst>
+          </p:cNvPr>
+          <p:cNvPicPr>
+            <a:picLocks noChangeAspect="1" noChangeArrowheads="1"/>
+          </p:cNvPicPr>
+          <p:nvPr/>
+        </p:nvPicPr>
+        <p:blipFill rotWithShape="1">
+          <a:blip r:embed="rId2">
+            <a:extLst>
+              <a:ext uri="{28A0092B-C50C-407E-A947-70E740481C1C}">
+                <a14:useLocalDpi xmlns:a14="http://schemas.microsoft.com/office/drawing/2010/main" val="0"/>
+              </a:ext>
+            </a:extLst>
+          </a:blip>
+          <a:srcRect l="33334" t="13824" r="7499" b="6208"/>
+          <a:stretch/>
+        </p:blipFill>
+        <p:spPr bwMode="auto">
+          <a:xfrm>
+            <a:off x="1162050" y="2440547"/>
+            <a:ext cx="6819900" cy="4034307"/>
+          </a:xfrm>
+          <a:prstGeom prst="rect">
+            <a:avLst/>
+          </a:prstGeom>
+          <a:noFill/>
+          <a:extLst>
+            <a:ext uri="{909E8E84-426E-40DD-AFC4-6F175D3DCCD1}">
+              <a14:hiddenFill xmlns:a14="http://schemas.microsoft.com/office/drawing/2010/main">
+                <a:solidFill>
+                  <a:srgbClr val="FFFFFF"/>
+                </a:solidFill>
+              </a14:hiddenFill>
+            </a:ext>
+          </a:extLst>
+        </p:spPr>
+      </p:pic>
     </p:spTree>
     <p:extLst>
       <p:ext uri="{BB962C8B-B14F-4D97-AF65-F5344CB8AC3E}">

</xml_diff>